<commit_message>
fill in Word and Powerpoint template
</commit_message>
<xml_diff>
--- a/04_output/Präsentation_Case_Study_1_Bieg_Krug.pptx
+++ b/04_output/Präsentation_Case_Study_1_Bieg_Krug.pptx
@@ -194,6 +194,9 @@
           </p15:clr>
         </p15:guide>
       </p15:sldGuideLst>
+    </p:ext>
+    <p:ext uri="{2D200454-40CA-4A62-9FC3-DE9A4176ACB9}">
+      <p15:notesGuideLst xmlns:p15="http://schemas.microsoft.com/office/powerpoint/2012/main"/>
     </p:ext>
   </p:extLst>
 </p:presentation>
@@ -644,7 +647,7 @@
               </a14:hiddenFill>
             </a:ext>
             <a:ext uri="{FAA26D3D-D897-4be2-8F04-BA451C77F1D7}">
-              <ma14:placeholderFlag xmlns="" xmlns:ma14="http://schemas.microsoft.com/office/mac/drawingml/2011/main" val="1"/>
+              <ma14:placeholderFlag xmlns:ma14="http://schemas.microsoft.com/office/mac/drawingml/2011/main" xmlns="" val="1"/>
             </a:ext>
           </a:extLst>
         </p:spPr>
@@ -1380,7 +1383,7 @@
               </a14:hiddenLine>
             </a:ext>
             <a:ext uri="{FAA26D3D-D897-4be2-8F04-BA451C77F1D7}">
-              <ma14:placeholderFlag xmlns="" xmlns:ma14="http://schemas.microsoft.com/office/mac/drawingml/2011/main" val="1"/>
+              <ma14:placeholderFlag xmlns:ma14="http://schemas.microsoft.com/office/mac/drawingml/2011/main" xmlns="" val="1"/>
             </a:ext>
           </a:extLst>
         </p:spPr>
@@ -5127,7 +5130,7 @@
               </a14:hiddenLine>
             </a:ext>
             <a:ext uri="{FAA26D3D-D897-4be2-8F04-BA451C77F1D7}">
-              <ma14:placeholderFlag xmlns="" xmlns:ma14="http://schemas.microsoft.com/office/mac/drawingml/2011/main" val="1"/>
+              <ma14:placeholderFlag xmlns:ma14="http://schemas.microsoft.com/office/mac/drawingml/2011/main" xmlns="" val="1"/>
             </a:ext>
           </a:extLst>
         </p:spPr>
@@ -7361,7 +7364,7 @@
               </a14:hiddenLine>
             </a:ext>
             <a:ext uri="{FAA26D3D-D897-4be2-8F04-BA451C77F1D7}">
-              <ma14:placeholderFlag xmlns="" xmlns:ma14="http://schemas.microsoft.com/office/mac/drawingml/2011/main" val="1"/>
+              <ma14:placeholderFlag xmlns:ma14="http://schemas.microsoft.com/office/mac/drawingml/2011/main" xmlns="" val="1"/>
             </a:ext>
           </a:extLst>
         </p:spPr>
@@ -7961,7 +7964,7 @@
               </a14:hiddenLine>
             </a:ext>
             <a:ext uri="{FAA26D3D-D897-4be2-8F04-BA451C77F1D7}">
-              <ma14:placeholderFlag xmlns="" xmlns:ma14="http://schemas.microsoft.com/office/mac/drawingml/2011/main" val="1"/>
+              <ma14:placeholderFlag xmlns:ma14="http://schemas.microsoft.com/office/mac/drawingml/2011/main" xmlns="" val="1"/>
             </a:ext>
           </a:extLst>
         </p:spPr>
@@ -10743,7 +10746,7 @@
               </a14:hiddenLine>
             </a:ext>
             <a:ext uri="{FAA26D3D-D897-4be2-8F04-BA451C77F1D7}">
-              <ma14:placeholderFlag xmlns="" xmlns:ma14="http://schemas.microsoft.com/office/mac/drawingml/2011/main" val="1"/>
+              <ma14:placeholderFlag xmlns:ma14="http://schemas.microsoft.com/office/mac/drawingml/2011/main" xmlns="" val="1"/>
             </a:ext>
           </a:extLst>
         </p:spPr>
@@ -10813,7 +10816,7 @@
               </a14:hiddenLine>
             </a:ext>
             <a:ext uri="{FAA26D3D-D897-4be2-8F04-BA451C77F1D7}">
-              <ma14:placeholderFlag xmlns="" xmlns:ma14="http://schemas.microsoft.com/office/mac/drawingml/2011/main" val="1"/>
+              <ma14:placeholderFlag xmlns:ma14="http://schemas.microsoft.com/office/mac/drawingml/2011/main" xmlns="" val="1"/>
             </a:ext>
           </a:extLst>
         </p:spPr>
@@ -11493,7 +11496,7 @@
           <a:p>
             <a:r>
               <a:rPr lang="de-DE" dirty="0"/>
-              <a:t>Case Study 1 S S2020</a:t>
+              <a:t>Case Study 1 SE S2020</a:t>
             </a:r>
           </a:p>
         </p:txBody>
@@ -13235,7 +13238,7 @@
             </a14:hiddenLine>
           </a:ext>
           <a:ext uri="{FAA26D3D-D897-4be2-8F04-BA451C77F1D7}">
-            <ma14:placeholderFlag xmlns="" xmlns:ma14="http://schemas.microsoft.com/office/mac/drawingml/2011/main" val="1"/>
+            <ma14:placeholderFlag xmlns:ma14="http://schemas.microsoft.com/office/mac/drawingml/2011/main" xmlns="" val="1"/>
           </a:ext>
         </a:extLst>
       </a:spPr>

</xml_diff>

<commit_message>
Add slides on integrity checks
</commit_message>
<xml_diff>
--- a/04_output/Präsentation_Case_Study_1_Bieg_Krug.pptx
+++ b/04_output/Präsentation_Case_Study_1_Bieg_Krug.pptx
@@ -5,18 +5,23 @@
     <p:sldMasterId id="2147484727" r:id="rId1"/>
   </p:sldMasterIdLst>
   <p:notesMasterIdLst>
-    <p:notesMasterId r:id="rId8"/>
+    <p:notesMasterId r:id="rId13"/>
   </p:notesMasterIdLst>
   <p:handoutMasterIdLst>
-    <p:handoutMasterId r:id="rId9"/>
+    <p:handoutMasterId r:id="rId14"/>
   </p:handoutMasterIdLst>
   <p:sldIdLst>
     <p:sldId id="478" r:id="rId2"/>
     <p:sldId id="479" r:id="rId3"/>
-    <p:sldId id="431" r:id="rId4"/>
-    <p:sldId id="453" r:id="rId5"/>
-    <p:sldId id="387" r:id="rId6"/>
-    <p:sldId id="455" r:id="rId7"/>
+    <p:sldId id="480" r:id="rId4"/>
+    <p:sldId id="481" r:id="rId5"/>
+    <p:sldId id="482" r:id="rId6"/>
+    <p:sldId id="483" r:id="rId7"/>
+    <p:sldId id="484" r:id="rId8"/>
+    <p:sldId id="486" r:id="rId9"/>
+    <p:sldId id="453" r:id="rId10"/>
+    <p:sldId id="485" r:id="rId11"/>
+    <p:sldId id="455" r:id="rId12"/>
   </p:sldIdLst>
   <p:sldSz cx="12192000" cy="6858000"/>
   <p:notesSz cx="6797675" cy="9926638"/>
@@ -647,7 +652,7 @@
               </a14:hiddenFill>
             </a:ext>
             <a:ext uri="{FAA26D3D-D897-4be2-8F04-BA451C77F1D7}">
-              <ma14:placeholderFlag xmlns:ma14="http://schemas.microsoft.com/office/mac/drawingml/2011/main" xmlns="" val="1"/>
+              <ma14:placeholderFlag xmlns="" xmlns:ma14="http://schemas.microsoft.com/office/mac/drawingml/2011/main" val="1"/>
             </a:ext>
           </a:extLst>
         </p:spPr>
@@ -969,103 +974,6 @@
 </p:notesMaster>
 </file>
 
-<file path=ppt/notesSlides/notesSlide1.xml><?xml version="1.0" encoding="utf-8"?>
-<p:notes xmlns:a="http://schemas.openxmlformats.org/drawingml/2006/main" xmlns:r="http://schemas.openxmlformats.org/officeDocument/2006/relationships" xmlns:p="http://schemas.openxmlformats.org/presentationml/2006/main">
-  <p:cSld>
-    <p:spTree>
-      <p:nvGrpSpPr>
-        <p:cNvPr id="1" name=""/>
-        <p:cNvGrpSpPr/>
-        <p:nvPr/>
-      </p:nvGrpSpPr>
-      <p:grpSpPr>
-        <a:xfrm>
-          <a:off x="0" y="0"/>
-          <a:ext cx="0" cy="0"/>
-          <a:chOff x="0" y="0"/>
-          <a:chExt cx="0" cy="0"/>
-        </a:xfrm>
-      </p:grpSpPr>
-      <p:sp>
-        <p:nvSpPr>
-          <p:cNvPr id="2" name="Slide Image Placeholder 1"/>
-          <p:cNvSpPr>
-            <a:spLocks noGrp="1" noRot="1" noChangeAspect="1"/>
-          </p:cNvSpPr>
-          <p:nvPr>
-            <p:ph type="sldImg"/>
-          </p:nvPr>
-        </p:nvSpPr>
-        <p:spPr/>
-      </p:sp>
-      <p:sp>
-        <p:nvSpPr>
-          <p:cNvPr id="3" name="Notes Placeholder 2"/>
-          <p:cNvSpPr>
-            <a:spLocks noGrp="1"/>
-          </p:cNvSpPr>
-          <p:nvPr>
-            <p:ph type="body" idx="1"/>
-          </p:nvPr>
-        </p:nvSpPr>
-        <p:spPr/>
-        <p:txBody>
-          <a:bodyPr/>
-          <a:lstStyle/>
-          <a:p>
-            <a:endParaRPr lang="de-DE" dirty="0">
-              <a:solidFill>
-                <a:srgbClr val="FF0000"/>
-              </a:solidFill>
-              <a:highlight>
-                <a:srgbClr val="FFFF00"/>
-              </a:highlight>
-            </a:endParaRPr>
-          </a:p>
-        </p:txBody>
-      </p:sp>
-      <p:sp>
-        <p:nvSpPr>
-          <p:cNvPr id="4" name="Slide Number Placeholder 3"/>
-          <p:cNvSpPr>
-            <a:spLocks noGrp="1"/>
-          </p:cNvSpPr>
-          <p:nvPr>
-            <p:ph type="sldNum" sz="quarter" idx="10"/>
-          </p:nvPr>
-        </p:nvSpPr>
-        <p:spPr/>
-        <p:txBody>
-          <a:bodyPr/>
-          <a:lstStyle/>
-          <a:p>
-            <a:pPr>
-              <a:defRPr/>
-            </a:pPr>
-            <a:fld id="{1148692A-D6D2-8340-BB47-13E8A19B5FC4}" type="slidenum">
-              <a:rPr lang="de-DE" smtClean="0"/>
-              <a:pPr>
-                <a:defRPr/>
-              </a:pPr>
-              <a:t>5</a:t>
-            </a:fld>
-            <a:endParaRPr lang="de-DE"/>
-          </a:p>
-        </p:txBody>
-      </p:sp>
-    </p:spTree>
-    <p:extLst>
-      <p:ext uri="{BB962C8B-B14F-4D97-AF65-F5344CB8AC3E}">
-        <p14:creationId xmlns:p14="http://schemas.microsoft.com/office/powerpoint/2010/main" val="2678492554"/>
-      </p:ext>
-    </p:extLst>
-  </p:cSld>
-  <p:clrMapOvr>
-    <a:masterClrMapping/>
-  </p:clrMapOvr>
-</p:notes>
-</file>
-
 <file path=ppt/slideLayouts/slideLayout1.xml><?xml version="1.0" encoding="utf-8"?>
 <p:sldLayout xmlns:a="http://schemas.openxmlformats.org/drawingml/2006/main" xmlns:r="http://schemas.openxmlformats.org/officeDocument/2006/relationships" xmlns:p="http://schemas.openxmlformats.org/presentationml/2006/main" showMasterSp="0" preserve="1" userDrawn="1">
   <p:cSld name="Titelfolie">
@@ -1383,7 +1291,7 @@
               </a14:hiddenLine>
             </a:ext>
             <a:ext uri="{FAA26D3D-D897-4be2-8F04-BA451C77F1D7}">
-              <ma14:placeholderFlag xmlns:ma14="http://schemas.microsoft.com/office/mac/drawingml/2011/main" xmlns="" val="1"/>
+              <ma14:placeholderFlag xmlns="" xmlns:ma14="http://schemas.microsoft.com/office/mac/drawingml/2011/main" val="1"/>
             </a:ext>
           </a:extLst>
         </p:spPr>
@@ -1519,7 +1427,7 @@
             </a:pPr>
             <a:fld id="{5F8A39F7-97EC-2142-B264-F44D66BBE89D}" type="datetime1">
               <a:rPr lang="en-GB" noProof="0" smtClean="0"/>
-              <a:t>16/06/2020</a:t>
+              <a:t>21/06/2020</a:t>
             </a:fld>
             <a:endParaRPr lang="en-GB" noProof="0"/>
           </a:p>
@@ -2827,7 +2735,7 @@
             </a:pPr>
             <a:fld id="{198AD64C-CCF5-CC4A-BA46-EEB0FF8EC03D}" type="datetime1">
               <a:rPr lang="en-GB" noProof="0" smtClean="0"/>
-              <a:t>16/06/2020</a:t>
+              <a:t>21/06/2020</a:t>
             </a:fld>
             <a:endParaRPr lang="en-GB" sz="1867" noProof="0"/>
           </a:p>
@@ -5130,7 +5038,7 @@
               </a14:hiddenLine>
             </a:ext>
             <a:ext uri="{FAA26D3D-D897-4be2-8F04-BA451C77F1D7}">
-              <ma14:placeholderFlag xmlns:ma14="http://schemas.microsoft.com/office/mac/drawingml/2011/main" xmlns="" val="1"/>
+              <ma14:placeholderFlag xmlns="" xmlns:ma14="http://schemas.microsoft.com/office/mac/drawingml/2011/main" val="1"/>
             </a:ext>
           </a:extLst>
         </p:spPr>
@@ -6781,7 +6689,7 @@
             </a:pPr>
             <a:fld id="{F36B4F74-2901-1B4A-A15E-8C1388FF047B}" type="datetime1">
               <a:rPr lang="en-GB" noProof="0" smtClean="0"/>
-              <a:t>16/06/2020</a:t>
+              <a:t>21/06/2020</a:t>
             </a:fld>
             <a:endParaRPr lang="en-GB" noProof="0"/>
           </a:p>
@@ -7073,7 +6981,7 @@
             </a:pPr>
             <a:fld id="{98FC4669-B5B2-424D-A5E6-D35A4A957E17}" type="datetime1">
               <a:rPr lang="en-GB" noProof="0" smtClean="0"/>
-              <a:t>16/06/2020</a:t>
+              <a:t>21/06/2020</a:t>
             </a:fld>
             <a:endParaRPr lang="en-GB" noProof="0"/>
           </a:p>
@@ -7266,7 +7174,7 @@
             </a:pPr>
             <a:fld id="{822CDA6A-1854-574C-A769-87800A426702}" type="datetime1">
               <a:rPr lang="en-GB" noProof="0" smtClean="0"/>
-              <a:t>16/06/2020</a:t>
+              <a:t>21/06/2020</a:t>
             </a:fld>
             <a:endParaRPr lang="en-GB" sz="1867" noProof="0"/>
           </a:p>
@@ -7364,7 +7272,7 @@
               </a14:hiddenLine>
             </a:ext>
             <a:ext uri="{FAA26D3D-D897-4be2-8F04-BA451C77F1D7}">
-              <ma14:placeholderFlag xmlns:ma14="http://schemas.microsoft.com/office/mac/drawingml/2011/main" xmlns="" val="1"/>
+              <ma14:placeholderFlag xmlns="" xmlns:ma14="http://schemas.microsoft.com/office/mac/drawingml/2011/main" val="1"/>
             </a:ext>
           </a:extLst>
         </p:spPr>
@@ -7604,7 +7512,7 @@
             </a:pPr>
             <a:fld id="{822CDA6A-1854-574C-A769-87800A426702}" type="datetime1">
               <a:rPr lang="en-GB" noProof="0" smtClean="0"/>
-              <a:t>16/06/2020</a:t>
+              <a:t>21/06/2020</a:t>
             </a:fld>
             <a:endParaRPr lang="en-GB" sz="1867" noProof="0"/>
           </a:p>
@@ -7833,7 +7741,7 @@
             </a:pPr>
             <a:fld id="{198AD64C-CCF5-CC4A-BA46-EEB0FF8EC03D}" type="datetime1">
               <a:rPr lang="en-GB" noProof="0" smtClean="0"/>
-              <a:t>16/06/2020</a:t>
+              <a:t>21/06/2020</a:t>
             </a:fld>
             <a:endParaRPr lang="en-GB" sz="1867" noProof="0"/>
           </a:p>
@@ -7964,7 +7872,7 @@
               </a14:hiddenLine>
             </a:ext>
             <a:ext uri="{FAA26D3D-D897-4be2-8F04-BA451C77F1D7}">
-              <ma14:placeholderFlag xmlns:ma14="http://schemas.microsoft.com/office/mac/drawingml/2011/main" xmlns="" val="1"/>
+              <ma14:placeholderFlag xmlns="" xmlns:ma14="http://schemas.microsoft.com/office/mac/drawingml/2011/main" val="1"/>
             </a:ext>
           </a:extLst>
         </p:spPr>
@@ -9337,7 +9245,7 @@
             </a:pPr>
             <a:fld id="{2FAF9002-F3AC-9D48-9425-5ADC68E24044}" type="datetime1">
               <a:rPr lang="en-GB" noProof="0" smtClean="0"/>
-              <a:t>16/06/2020</a:t>
+              <a:t>21/06/2020</a:t>
             </a:fld>
             <a:endParaRPr lang="en-GB" noProof="0"/>
           </a:p>
@@ -10699,7 +10607,7 @@
             </a:pPr>
             <a:fld id="{A5197BF1-BDDE-E74D-BA45-32BDC1105D8B}" type="datetime1">
               <a:rPr lang="en-GB" noProof="0" smtClean="0"/>
-              <a:t>16/06/2020</a:t>
+              <a:t>21/06/2020</a:t>
             </a:fld>
             <a:endParaRPr lang="en-GB" noProof="0"/>
           </a:p>
@@ -10746,7 +10654,7 @@
               </a14:hiddenLine>
             </a:ext>
             <a:ext uri="{FAA26D3D-D897-4be2-8F04-BA451C77F1D7}">
-              <ma14:placeholderFlag xmlns:ma14="http://schemas.microsoft.com/office/mac/drawingml/2011/main" xmlns="" val="1"/>
+              <ma14:placeholderFlag xmlns="" xmlns:ma14="http://schemas.microsoft.com/office/mac/drawingml/2011/main" val="1"/>
             </a:ext>
           </a:extLst>
         </p:spPr>
@@ -10816,7 +10724,7 @@
               </a14:hiddenLine>
             </a:ext>
             <a:ext uri="{FAA26D3D-D897-4be2-8F04-BA451C77F1D7}">
-              <ma14:placeholderFlag xmlns:ma14="http://schemas.microsoft.com/office/mac/drawingml/2011/main" xmlns="" val="1"/>
+              <ma14:placeholderFlag xmlns="" xmlns:ma14="http://schemas.microsoft.com/office/mac/drawingml/2011/main" val="1"/>
             </a:ext>
           </a:extLst>
         </p:spPr>
@@ -11542,6 +11450,399 @@
 </p:sld>
 </file>
 
+<file path=ppt/slides/slide10.xml><?xml version="1.0" encoding="utf-8"?>
+<p:sld xmlns:a="http://schemas.openxmlformats.org/drawingml/2006/main" xmlns:r="http://schemas.openxmlformats.org/officeDocument/2006/relationships" xmlns:p="http://schemas.openxmlformats.org/presentationml/2006/main">
+  <p:cSld>
+    <p:spTree>
+      <p:nvGrpSpPr>
+        <p:cNvPr id="1" name=""/>
+        <p:cNvGrpSpPr/>
+        <p:nvPr/>
+      </p:nvGrpSpPr>
+      <p:grpSpPr>
+        <a:xfrm>
+          <a:off x="0" y="0"/>
+          <a:ext cx="0" cy="0"/>
+          <a:chOff x="0" y="0"/>
+          <a:chExt cx="0" cy="0"/>
+        </a:xfrm>
+      </p:grpSpPr>
+      <p:sp>
+        <p:nvSpPr>
+          <p:cNvPr id="2" name="Inhaltsplatzhalter 1">
+            <a:extLst>
+              <a:ext uri="{FF2B5EF4-FFF2-40B4-BE49-F238E27FC236}">
+                <a16:creationId xmlns:a16="http://schemas.microsoft.com/office/drawing/2014/main" id="{37EB84E5-4FE3-448F-90C8-CCFDDB85E335}"/>
+              </a:ext>
+            </a:extLst>
+          </p:cNvPr>
+          <p:cNvSpPr>
+            <a:spLocks noGrp="1"/>
+          </p:cNvSpPr>
+          <p:nvPr>
+            <p:ph sz="quarter" idx="12"/>
+          </p:nvPr>
+        </p:nvSpPr>
+        <p:spPr>
+          <a:xfrm>
+            <a:off x="706967" y="1604797"/>
+            <a:ext cx="10573609" cy="4488499"/>
+          </a:xfrm>
+        </p:spPr>
+        <p:txBody>
+          <a:bodyPr/>
+          <a:lstStyle/>
+          <a:p>
+            <a:r>
+              <a:rPr lang="de-DE" dirty="0"/>
+              <a:t>48 Benutzer insgesamt</a:t>
+            </a:r>
+          </a:p>
+          <a:p>
+            <a:r>
+              <a:rPr lang="de-DE" dirty="0"/>
+              <a:t>Starke Unterschiede in der Buchungshäufigkeit zwischen Benutzern und Departments (siehe Plots)</a:t>
+            </a:r>
+          </a:p>
+          <a:p>
+            <a:r>
+              <a:rPr lang="de-DE" dirty="0"/>
+              <a:t>Nutzer assoziiert mit lückenhaften </a:t>
+            </a:r>
+            <a:r>
+              <a:rPr lang="de-DE" dirty="0" err="1"/>
+              <a:t>Journaleneinträgen</a:t>
+            </a:r>
+            <a:r>
+              <a:rPr lang="de-DE" dirty="0"/>
+              <a:t>: Viele Buchungen insgesamt</a:t>
+            </a:r>
+          </a:p>
+          <a:p>
+            <a:endParaRPr lang="de-DE" dirty="0"/>
+          </a:p>
+          <a:p>
+            <a:endParaRPr lang="de-DE" dirty="0"/>
+          </a:p>
+        </p:txBody>
+      </p:sp>
+      <p:sp>
+        <p:nvSpPr>
+          <p:cNvPr id="3" name="Titel 2">
+            <a:extLst>
+              <a:ext uri="{FF2B5EF4-FFF2-40B4-BE49-F238E27FC236}">
+                <a16:creationId xmlns:a16="http://schemas.microsoft.com/office/drawing/2014/main" id="{AC49AAFB-8F41-495C-BFBA-39E6E19A85DF}"/>
+              </a:ext>
+            </a:extLst>
+          </p:cNvPr>
+          <p:cNvSpPr>
+            <a:spLocks noGrp="1"/>
+          </p:cNvSpPr>
+          <p:nvPr>
+            <p:ph type="title"/>
+          </p:nvPr>
+        </p:nvSpPr>
+        <p:spPr/>
+        <p:txBody>
+          <a:bodyPr/>
+          <a:lstStyle/>
+          <a:p>
+            <a:r>
+              <a:rPr lang="de-DE" dirty="0"/>
+              <a:t>Prüfung der Buchenden Personen</a:t>
+            </a:r>
+          </a:p>
+        </p:txBody>
+      </p:sp>
+      <p:sp>
+        <p:nvSpPr>
+          <p:cNvPr id="4" name="Foliennummernplatzhalter 3">
+            <a:extLst>
+              <a:ext uri="{FF2B5EF4-FFF2-40B4-BE49-F238E27FC236}">
+                <a16:creationId xmlns:a16="http://schemas.microsoft.com/office/drawing/2014/main" id="{0085E0B9-B99C-40E0-9198-6D07F2500AD7}"/>
+              </a:ext>
+            </a:extLst>
+          </p:cNvPr>
+          <p:cNvSpPr>
+            <a:spLocks noGrp="1"/>
+          </p:cNvSpPr>
+          <p:nvPr>
+            <p:ph type="sldNum" sz="quarter" idx="4"/>
+          </p:nvPr>
+        </p:nvSpPr>
+        <p:spPr/>
+        <p:txBody>
+          <a:bodyPr/>
+          <a:lstStyle/>
+          <a:p>
+            <a:pPr>
+              <a:defRPr/>
+            </a:pPr>
+            <a:fld id="{9FF9BEAF-778C-7446-863C-7292389481CB}" type="slidenum">
+              <a:rPr lang="en-GB" noProof="0" smtClean="0"/>
+              <a:pPr>
+                <a:defRPr/>
+              </a:pPr>
+              <a:t>10</a:t>
+            </a:fld>
+            <a:endParaRPr lang="en-GB" noProof="0"/>
+          </a:p>
+        </p:txBody>
+      </p:sp>
+      <p:sp>
+        <p:nvSpPr>
+          <p:cNvPr id="5" name="Datumsplatzhalter 4">
+            <a:extLst>
+              <a:ext uri="{FF2B5EF4-FFF2-40B4-BE49-F238E27FC236}">
+                <a16:creationId xmlns:a16="http://schemas.microsoft.com/office/drawing/2014/main" id="{2445F8B9-AB5E-46BF-8545-0BCD332A1819}"/>
+              </a:ext>
+            </a:extLst>
+          </p:cNvPr>
+          <p:cNvSpPr>
+            <a:spLocks noGrp="1"/>
+          </p:cNvSpPr>
+          <p:nvPr>
+            <p:ph type="dt" sz="half" idx="2"/>
+          </p:nvPr>
+        </p:nvSpPr>
+        <p:spPr/>
+        <p:txBody>
+          <a:bodyPr/>
+          <a:lstStyle/>
+          <a:p>
+            <a:pPr>
+              <a:defRPr/>
+            </a:pPr>
+            <a:fld id="{F36B4F74-2901-1B4A-A15E-8C1388FF047B}" type="datetime1">
+              <a:rPr lang="en-GB" noProof="0" smtClean="0"/>
+              <a:t>21/06/2020</a:t>
+            </a:fld>
+            <a:endParaRPr lang="en-GB" noProof="0"/>
+          </a:p>
+        </p:txBody>
+      </p:sp>
+      <p:pic>
+        <p:nvPicPr>
+          <p:cNvPr id="8" name="Grafik 7">
+            <a:extLst>
+              <a:ext uri="{FF2B5EF4-FFF2-40B4-BE49-F238E27FC236}">
+                <a16:creationId xmlns:a16="http://schemas.microsoft.com/office/drawing/2014/main" id="{F16F6C54-7335-464A-9BB8-C9F1A1EB4C66}"/>
+              </a:ext>
+            </a:extLst>
+          </p:cNvPr>
+          <p:cNvPicPr/>
+          <p:nvPr/>
+        </p:nvPicPr>
+        <p:blipFill>
+          <a:blip r:embed="rId2"/>
+          <a:stretch>
+            <a:fillRect/>
+          </a:stretch>
+        </p:blipFill>
+        <p:spPr>
+          <a:xfrm>
+            <a:off x="6221154" y="3182611"/>
+            <a:ext cx="5294571" cy="2910685"/>
+          </a:xfrm>
+          <a:prstGeom prst="rect">
+            <a:avLst/>
+          </a:prstGeom>
+          <a:ln>
+            <a:solidFill>
+              <a:schemeClr val="bg1">
+                <a:lumMod val="85000"/>
+              </a:schemeClr>
+            </a:solidFill>
+          </a:ln>
+        </p:spPr>
+      </p:pic>
+      <p:pic>
+        <p:nvPicPr>
+          <p:cNvPr id="9" name="Grafik 8">
+            <a:extLst>
+              <a:ext uri="{FF2B5EF4-FFF2-40B4-BE49-F238E27FC236}">
+                <a16:creationId xmlns:a16="http://schemas.microsoft.com/office/drawing/2014/main" id="{F60EB7DA-B41C-4A52-8B7B-F90769823ADF}"/>
+              </a:ext>
+            </a:extLst>
+          </p:cNvPr>
+          <p:cNvPicPr/>
+          <p:nvPr/>
+        </p:nvPicPr>
+        <p:blipFill>
+          <a:blip r:embed="rId3"/>
+          <a:stretch>
+            <a:fillRect/>
+          </a:stretch>
+        </p:blipFill>
+        <p:spPr>
+          <a:xfrm>
+            <a:off x="704579" y="3182610"/>
+            <a:ext cx="5168267" cy="2910685"/>
+          </a:xfrm>
+          <a:prstGeom prst="rect">
+            <a:avLst/>
+          </a:prstGeom>
+          <a:ln>
+            <a:solidFill>
+              <a:schemeClr val="bg1">
+                <a:lumMod val="85000"/>
+              </a:schemeClr>
+            </a:solidFill>
+          </a:ln>
+        </p:spPr>
+      </p:pic>
+    </p:spTree>
+    <p:extLst>
+      <p:ext uri="{BB962C8B-B14F-4D97-AF65-F5344CB8AC3E}">
+        <p14:creationId xmlns:p14="http://schemas.microsoft.com/office/powerpoint/2010/main" val="2985715165"/>
+      </p:ext>
+    </p:extLst>
+  </p:cSld>
+  <p:clrMapOvr>
+    <a:masterClrMapping/>
+  </p:clrMapOvr>
+</p:sld>
+</file>
+
+<file path=ppt/slides/slide11.xml><?xml version="1.0" encoding="utf-8"?>
+<p:sld xmlns:a="http://schemas.openxmlformats.org/drawingml/2006/main" xmlns:r="http://schemas.openxmlformats.org/officeDocument/2006/relationships" xmlns:p="http://schemas.openxmlformats.org/presentationml/2006/main">
+  <p:cSld>
+    <p:spTree>
+      <p:nvGrpSpPr>
+        <p:cNvPr id="1" name=""/>
+        <p:cNvGrpSpPr/>
+        <p:nvPr/>
+      </p:nvGrpSpPr>
+      <p:grpSpPr>
+        <a:xfrm>
+          <a:off x="0" y="0"/>
+          <a:ext cx="0" cy="0"/>
+          <a:chOff x="0" y="0"/>
+          <a:chExt cx="0" cy="0"/>
+        </a:xfrm>
+      </p:grpSpPr>
+      <p:sp>
+        <p:nvSpPr>
+          <p:cNvPr id="2" name="Titel 1"/>
+          <p:cNvSpPr>
+            <a:spLocks noGrp="1"/>
+          </p:cNvSpPr>
+          <p:nvPr>
+            <p:ph type="ctrTitle" sz="quarter"/>
+          </p:nvPr>
+        </p:nvSpPr>
+        <p:spPr/>
+        <p:txBody>
+          <a:bodyPr/>
+          <a:lstStyle/>
+          <a:p>
+            <a:r>
+              <a:rPr lang="de-DE" dirty="0"/>
+              <a:t>Dankeschön!</a:t>
+            </a:r>
+          </a:p>
+        </p:txBody>
+      </p:sp>
+      <p:sp>
+        <p:nvSpPr>
+          <p:cNvPr id="4" name="Untertitel 3"/>
+          <p:cNvSpPr>
+            <a:spLocks noGrp="1"/>
+          </p:cNvSpPr>
+          <p:nvPr>
+            <p:ph type="subTitle" sz="quarter" idx="1"/>
+          </p:nvPr>
+        </p:nvSpPr>
+        <p:spPr>
+          <a:xfrm>
+            <a:off x="731233" y="2844000"/>
+            <a:ext cx="10765367" cy="801024"/>
+          </a:xfrm>
+        </p:spPr>
+        <p:txBody>
+          <a:bodyPr/>
+          <a:lstStyle/>
+          <a:p>
+            <a:r>
+              <a:rPr lang="de-DE" sz="1800" dirty="0"/>
+              <a:t>Till Bieg</a:t>
+            </a:r>
+          </a:p>
+          <a:p>
+            <a:r>
+              <a:rPr lang="de-DE" sz="1800" dirty="0">
+                <a:hlinkClick r:id="rId2"/>
+              </a:rPr>
+              <a:t>till.bieg@fhwn.ac.at</a:t>
+            </a:r>
+            <a:endParaRPr lang="de-DE" sz="1800" dirty="0"/>
+          </a:p>
+          <a:p>
+            <a:endParaRPr lang="de-DE" sz="1800" dirty="0"/>
+          </a:p>
+          <a:p>
+            <a:r>
+              <a:rPr lang="de-DE" sz="1800" dirty="0"/>
+              <a:t>David Krug</a:t>
+            </a:r>
+          </a:p>
+          <a:p>
+            <a:r>
+              <a:rPr lang="de-DE" sz="1800" dirty="0">
+                <a:hlinkClick r:id="rId3"/>
+              </a:rPr>
+              <a:t>david.krug@fhwn.ac.at</a:t>
+            </a:r>
+            <a:endParaRPr lang="de-DE" sz="1800" dirty="0"/>
+          </a:p>
+          <a:p>
+            <a:endParaRPr lang="de-DE" sz="1800" dirty="0"/>
+          </a:p>
+        </p:txBody>
+      </p:sp>
+      <p:pic>
+        <p:nvPicPr>
+          <p:cNvPr id="5" name="Grafik 4">
+            <a:extLst>
+              <a:ext uri="{FF2B5EF4-FFF2-40B4-BE49-F238E27FC236}">
+                <a16:creationId xmlns:a16="http://schemas.microsoft.com/office/drawing/2014/main" id="{D52A1927-7724-48FB-99A3-17E6E6E3959B}"/>
+              </a:ext>
+            </a:extLst>
+          </p:cNvPr>
+          <p:cNvPicPr>
+            <a:picLocks noChangeAspect="1"/>
+          </p:cNvPicPr>
+          <p:nvPr/>
+        </p:nvPicPr>
+        <p:blipFill>
+          <a:blip r:embed="rId4"/>
+          <a:stretch>
+            <a:fillRect/>
+          </a:stretch>
+        </p:blipFill>
+        <p:spPr>
+          <a:xfrm>
+            <a:off x="8760296" y="188640"/>
+            <a:ext cx="2655739" cy="2655739"/>
+          </a:xfrm>
+          <a:prstGeom prst="rect">
+            <a:avLst/>
+          </a:prstGeom>
+        </p:spPr>
+      </p:pic>
+    </p:spTree>
+    <p:extLst>
+      <p:ext uri="{BB962C8B-B14F-4D97-AF65-F5344CB8AC3E}">
+        <p14:creationId xmlns:p14="http://schemas.microsoft.com/office/powerpoint/2010/main" val="945694928"/>
+      </p:ext>
+    </p:extLst>
+  </p:cSld>
+  <p:clrMapOvr>
+    <a:masterClrMapping/>
+  </p:clrMapOvr>
+</p:sld>
+</file>
+
 <file path=ppt/slides/slide2.xml><?xml version="1.0" encoding="utf-8"?>
 <p:sld xmlns:a="http://schemas.openxmlformats.org/drawingml/2006/main" xmlns:r="http://schemas.openxmlformats.org/officeDocument/2006/relationships" xmlns:p="http://schemas.openxmlformats.org/presentationml/2006/main">
   <p:cSld>
@@ -11633,7 +11934,7 @@
           <a:bodyPr/>
           <a:lstStyle/>
           <a:p>
-            <a:pPr lvl="0">
+            <a:pPr>
               <a:lnSpc>
                 <a:spcPct val="150000"/>
               </a:lnSpc>
@@ -11652,8 +11953,13 @@
                   <a:schemeClr val="accent3"/>
                 </a:solidFill>
               </a:rPr>
-              <a:t>ETL-Prozesses</a:t>
+              <a:t>Technologie-Stacks</a:t>
             </a:r>
+            <a:endParaRPr lang="de-DE" dirty="0">
+              <a:solidFill>
+                <a:schemeClr val="accent6"/>
+              </a:solidFill>
+            </a:endParaRPr>
           </a:p>
           <a:p>
             <a:pPr lvl="0">
@@ -11675,7 +11981,7 @@
                   <a:schemeClr val="accent3"/>
                 </a:solidFill>
               </a:rPr>
-              <a:t>Technologie-Stacks</a:t>
+              <a:t>ETL-Prozesses</a:t>
             </a:r>
           </a:p>
           <a:p>
@@ -11738,40 +12044,6 @@
               </a:rPr>
               <a:t>Weiterführende Analysen</a:t>
             </a:r>
-          </a:p>
-          <a:p>
-            <a:pPr lvl="0">
-              <a:lnSpc>
-                <a:spcPct val="150000"/>
-              </a:lnSpc>
-            </a:pPr>
-            <a:r>
-              <a:rPr lang="de-DE" b="1" dirty="0">
-                <a:solidFill>
-                  <a:schemeClr val="accent3"/>
-                </a:solidFill>
-              </a:rPr>
-              <a:t>Schlussfolgerungen </a:t>
-            </a:r>
-            <a:r>
-              <a:rPr lang="de-DE" dirty="0">
-                <a:solidFill>
-                  <a:schemeClr val="accent6"/>
-                </a:solidFill>
-              </a:rPr>
-              <a:t>und</a:t>
-            </a:r>
-            <a:r>
-              <a:rPr lang="de-DE" b="1" dirty="0">
-                <a:solidFill>
-                  <a:schemeClr val="accent3"/>
-                </a:solidFill>
-              </a:rPr>
-              <a:t> Empfehlungen</a:t>
-            </a:r>
-          </a:p>
-          <a:p>
-            <a:endParaRPr lang="de-DE" dirty="0"/>
           </a:p>
         </p:txBody>
       </p:sp>
@@ -11836,7 +12108,7 @@
             </a:pPr>
             <a:fld id="{98FC4669-B5B2-424D-A5E6-D35A4A957E17}" type="datetime1">
               <a:rPr lang="en-GB" noProof="0" smtClean="0"/>
-              <a:t>16/06/2020</a:t>
+              <a:t>21/06/2020</a:t>
             </a:fld>
             <a:endParaRPr lang="en-GB" noProof="0"/>
           </a:p>
@@ -11874,10 +12146,10 @@
       </p:grpSpPr>
       <p:sp>
         <p:nvSpPr>
-          <p:cNvPr id="9" name="Subtitle 8">
+          <p:cNvPr id="2" name="Inhaltsplatzhalter 1">
             <a:extLst>
               <a:ext uri="{FF2B5EF4-FFF2-40B4-BE49-F238E27FC236}">
-                <a16:creationId xmlns:a16="http://schemas.microsoft.com/office/drawing/2014/main" id="{AC212368-CC9A-437C-9490-22EA3280981E}"/>
+                <a16:creationId xmlns:a16="http://schemas.microsoft.com/office/drawing/2014/main" id="{37EB84E5-4FE3-448F-90C8-CCFDDB85E335}"/>
               </a:ext>
             </a:extLst>
           </p:cNvPr>
@@ -11885,7 +12157,7 @@
             <a:spLocks noGrp="1"/>
           </p:cNvSpPr>
           <p:nvPr>
-            <p:ph type="subTitle" idx="1"/>
+            <p:ph sz="quarter" idx="12"/>
           </p:nvPr>
         </p:nvSpPr>
         <p:spPr/>
@@ -11893,19 +12165,16 @@
           <a:bodyPr/>
           <a:lstStyle/>
           <a:p>
-            <a:r>
-              <a:rPr lang="de-DE" dirty="0"/>
-              <a:t>…</a:t>
-            </a:r>
+            <a:endParaRPr lang="de-DE"/>
           </a:p>
         </p:txBody>
       </p:sp>
       <p:sp>
         <p:nvSpPr>
-          <p:cNvPr id="3" name="Title 2">
+          <p:cNvPr id="3" name="Titel 2">
             <a:extLst>
               <a:ext uri="{FF2B5EF4-FFF2-40B4-BE49-F238E27FC236}">
-                <a16:creationId xmlns:a16="http://schemas.microsoft.com/office/drawing/2014/main" id="{1BDEE5FD-25D4-4767-ABFC-DC81E1711FB1}"/>
+                <a16:creationId xmlns:a16="http://schemas.microsoft.com/office/drawing/2014/main" id="{AC49AAFB-8F41-495C-BFBA-39E6E19A85DF}"/>
               </a:ext>
             </a:extLst>
           </p:cNvPr>
@@ -11923,17 +12192,17 @@
           <a:p>
             <a:r>
               <a:rPr lang="de-DE" dirty="0"/>
-              <a:t>…</a:t>
+              <a:t>Beschreibung des Technology-Stacks</a:t>
             </a:r>
           </a:p>
         </p:txBody>
       </p:sp>
       <p:sp>
         <p:nvSpPr>
-          <p:cNvPr id="4" name="Slide Number Placeholder 3">
+          <p:cNvPr id="4" name="Foliennummernplatzhalter 3">
             <a:extLst>
               <a:ext uri="{FF2B5EF4-FFF2-40B4-BE49-F238E27FC236}">
-                <a16:creationId xmlns:a16="http://schemas.microsoft.com/office/drawing/2014/main" id="{E7B59FDF-1045-490F-9515-BFC8405B8387}"/>
+                <a16:creationId xmlns:a16="http://schemas.microsoft.com/office/drawing/2014/main" id="{0085E0B9-B99C-40E0-9198-6D07F2500AD7}"/>
               </a:ext>
             </a:extLst>
           </p:cNvPr>
@@ -11965,10 +12234,10 @@
       </p:sp>
       <p:sp>
         <p:nvSpPr>
-          <p:cNvPr id="5" name="Date Placeholder 4">
+          <p:cNvPr id="5" name="Datumsplatzhalter 4">
             <a:extLst>
               <a:ext uri="{FF2B5EF4-FFF2-40B4-BE49-F238E27FC236}">
-                <a16:creationId xmlns:a16="http://schemas.microsoft.com/office/drawing/2014/main" id="{48C6748F-A22D-4681-B689-4B247C67259E}"/>
+                <a16:creationId xmlns:a16="http://schemas.microsoft.com/office/drawing/2014/main" id="{2445F8B9-AB5E-46BF-8545-0BCD332A1819}"/>
               </a:ext>
             </a:extLst>
           </p:cNvPr>
@@ -11989,18 +12258,569 @@
             </a:pPr>
             <a:fld id="{F36B4F74-2901-1B4A-A15E-8C1388FF047B}" type="datetime1">
               <a:rPr lang="en-GB" noProof="0" smtClean="0"/>
-              <a:t>16/06/2020</a:t>
+              <a:t>21/06/2020</a:t>
             </a:fld>
-            <a:endParaRPr lang="en-GB" noProof="0" dirty="0"/>
+            <a:endParaRPr lang="en-GB" noProof="0"/>
+          </a:p>
+        </p:txBody>
+      </p:sp>
+    </p:spTree>
+    <p:extLst>
+      <p:ext uri="{BB962C8B-B14F-4D97-AF65-F5344CB8AC3E}">
+        <p14:creationId xmlns:p14="http://schemas.microsoft.com/office/powerpoint/2010/main" val="2441922402"/>
+      </p:ext>
+    </p:extLst>
+  </p:cSld>
+  <p:clrMapOvr>
+    <a:masterClrMapping/>
+  </p:clrMapOvr>
+</p:sld>
+</file>
+
+<file path=ppt/slides/slide4.xml><?xml version="1.0" encoding="utf-8"?>
+<p:sld xmlns:a="http://schemas.openxmlformats.org/drawingml/2006/main" xmlns:r="http://schemas.openxmlformats.org/officeDocument/2006/relationships" xmlns:p="http://schemas.openxmlformats.org/presentationml/2006/main">
+  <p:cSld>
+    <p:spTree>
+      <p:nvGrpSpPr>
+        <p:cNvPr id="1" name=""/>
+        <p:cNvGrpSpPr/>
+        <p:nvPr/>
+      </p:nvGrpSpPr>
+      <p:grpSpPr>
+        <a:xfrm>
+          <a:off x="0" y="0"/>
+          <a:ext cx="0" cy="0"/>
+          <a:chOff x="0" y="0"/>
+          <a:chExt cx="0" cy="0"/>
+        </a:xfrm>
+      </p:grpSpPr>
+      <p:sp>
+        <p:nvSpPr>
+          <p:cNvPr id="2" name="Inhaltsplatzhalter 1">
+            <a:extLst>
+              <a:ext uri="{FF2B5EF4-FFF2-40B4-BE49-F238E27FC236}">
+                <a16:creationId xmlns:a16="http://schemas.microsoft.com/office/drawing/2014/main" id="{37EB84E5-4FE3-448F-90C8-CCFDDB85E335}"/>
+              </a:ext>
+            </a:extLst>
+          </p:cNvPr>
+          <p:cNvSpPr>
+            <a:spLocks noGrp="1"/>
+          </p:cNvSpPr>
+          <p:nvPr>
+            <p:ph sz="quarter" idx="12"/>
+          </p:nvPr>
+        </p:nvSpPr>
+        <p:spPr/>
+        <p:txBody>
+          <a:bodyPr/>
+          <a:lstStyle/>
+          <a:p>
+            <a:endParaRPr lang="de-DE"/>
           </a:p>
         </p:txBody>
       </p:sp>
       <p:sp>
         <p:nvSpPr>
-          <p:cNvPr id="7" name="Inhaltsplatzhalter 7">
+          <p:cNvPr id="3" name="Titel 2">
             <a:extLst>
               <a:ext uri="{FF2B5EF4-FFF2-40B4-BE49-F238E27FC236}">
-                <a16:creationId xmlns:a16="http://schemas.microsoft.com/office/drawing/2014/main" id="{E9A565E4-C3FC-4968-B75A-0B84D1443432}"/>
+                <a16:creationId xmlns:a16="http://schemas.microsoft.com/office/drawing/2014/main" id="{AC49AAFB-8F41-495C-BFBA-39E6E19A85DF}"/>
+              </a:ext>
+            </a:extLst>
+          </p:cNvPr>
+          <p:cNvSpPr>
+            <a:spLocks noGrp="1"/>
+          </p:cNvSpPr>
+          <p:nvPr>
+            <p:ph type="title"/>
+          </p:nvPr>
+        </p:nvSpPr>
+        <p:spPr/>
+        <p:txBody>
+          <a:bodyPr/>
+          <a:lstStyle/>
+          <a:p>
+            <a:r>
+              <a:rPr lang="de-DE" dirty="0"/>
+              <a:t>Beschreibung des ETL-Prozesses</a:t>
+            </a:r>
+          </a:p>
+        </p:txBody>
+      </p:sp>
+      <p:sp>
+        <p:nvSpPr>
+          <p:cNvPr id="4" name="Foliennummernplatzhalter 3">
+            <a:extLst>
+              <a:ext uri="{FF2B5EF4-FFF2-40B4-BE49-F238E27FC236}">
+                <a16:creationId xmlns:a16="http://schemas.microsoft.com/office/drawing/2014/main" id="{0085E0B9-B99C-40E0-9198-6D07F2500AD7}"/>
+              </a:ext>
+            </a:extLst>
+          </p:cNvPr>
+          <p:cNvSpPr>
+            <a:spLocks noGrp="1"/>
+          </p:cNvSpPr>
+          <p:nvPr>
+            <p:ph type="sldNum" sz="quarter" idx="4"/>
+          </p:nvPr>
+        </p:nvSpPr>
+        <p:spPr/>
+        <p:txBody>
+          <a:bodyPr/>
+          <a:lstStyle/>
+          <a:p>
+            <a:pPr>
+              <a:defRPr/>
+            </a:pPr>
+            <a:fld id="{9FF9BEAF-778C-7446-863C-7292389481CB}" type="slidenum">
+              <a:rPr lang="en-GB" noProof="0" smtClean="0"/>
+              <a:pPr>
+                <a:defRPr/>
+              </a:pPr>
+              <a:t>4</a:t>
+            </a:fld>
+            <a:endParaRPr lang="en-GB" noProof="0"/>
+          </a:p>
+        </p:txBody>
+      </p:sp>
+      <p:sp>
+        <p:nvSpPr>
+          <p:cNvPr id="5" name="Datumsplatzhalter 4">
+            <a:extLst>
+              <a:ext uri="{FF2B5EF4-FFF2-40B4-BE49-F238E27FC236}">
+                <a16:creationId xmlns:a16="http://schemas.microsoft.com/office/drawing/2014/main" id="{2445F8B9-AB5E-46BF-8545-0BCD332A1819}"/>
+              </a:ext>
+            </a:extLst>
+          </p:cNvPr>
+          <p:cNvSpPr>
+            <a:spLocks noGrp="1"/>
+          </p:cNvSpPr>
+          <p:nvPr>
+            <p:ph type="dt" sz="half" idx="2"/>
+          </p:nvPr>
+        </p:nvSpPr>
+        <p:spPr/>
+        <p:txBody>
+          <a:bodyPr/>
+          <a:lstStyle/>
+          <a:p>
+            <a:pPr>
+              <a:defRPr/>
+            </a:pPr>
+            <a:fld id="{F36B4F74-2901-1B4A-A15E-8C1388FF047B}" type="datetime1">
+              <a:rPr lang="en-GB" noProof="0" smtClean="0"/>
+              <a:t>21/06/2020</a:t>
+            </a:fld>
+            <a:endParaRPr lang="en-GB" noProof="0"/>
+          </a:p>
+        </p:txBody>
+      </p:sp>
+    </p:spTree>
+    <p:extLst>
+      <p:ext uri="{BB962C8B-B14F-4D97-AF65-F5344CB8AC3E}">
+        <p14:creationId xmlns:p14="http://schemas.microsoft.com/office/powerpoint/2010/main" val="3996377096"/>
+      </p:ext>
+    </p:extLst>
+  </p:cSld>
+  <p:clrMapOvr>
+    <a:masterClrMapping/>
+  </p:clrMapOvr>
+</p:sld>
+</file>
+
+<file path=ppt/slides/slide5.xml><?xml version="1.0" encoding="utf-8"?>
+<p:sld xmlns:a="http://schemas.openxmlformats.org/drawingml/2006/main" xmlns:r="http://schemas.openxmlformats.org/officeDocument/2006/relationships" xmlns:p="http://schemas.openxmlformats.org/presentationml/2006/main">
+  <p:cSld>
+    <p:spTree>
+      <p:nvGrpSpPr>
+        <p:cNvPr id="1" name=""/>
+        <p:cNvGrpSpPr/>
+        <p:nvPr/>
+      </p:nvGrpSpPr>
+      <p:grpSpPr>
+        <a:xfrm>
+          <a:off x="0" y="0"/>
+          <a:ext cx="0" cy="0"/>
+          <a:chOff x="0" y="0"/>
+          <a:chExt cx="0" cy="0"/>
+        </a:xfrm>
+      </p:grpSpPr>
+      <p:sp>
+        <p:nvSpPr>
+          <p:cNvPr id="6" name="Inhaltsplatzhalter 5">
+            <a:extLst>
+              <a:ext uri="{FF2B5EF4-FFF2-40B4-BE49-F238E27FC236}">
+                <a16:creationId xmlns:a16="http://schemas.microsoft.com/office/drawing/2014/main" id="{6EF291F0-EBCF-4EA4-A410-B80056457445}"/>
+              </a:ext>
+            </a:extLst>
+          </p:cNvPr>
+          <p:cNvSpPr>
+            <a:spLocks noGrp="1"/>
+          </p:cNvSpPr>
+          <p:nvPr>
+            <p:ph sz="half" idx="1"/>
+          </p:nvPr>
+        </p:nvSpPr>
+        <p:spPr/>
+        <p:txBody>
+          <a:bodyPr/>
+          <a:lstStyle/>
+          <a:p>
+            <a:endParaRPr lang="de-DE"/>
+          </a:p>
+        </p:txBody>
+      </p:sp>
+      <p:sp>
+        <p:nvSpPr>
+          <p:cNvPr id="4" name="Foliennummernplatzhalter 3">
+            <a:extLst>
+              <a:ext uri="{FF2B5EF4-FFF2-40B4-BE49-F238E27FC236}">
+                <a16:creationId xmlns:a16="http://schemas.microsoft.com/office/drawing/2014/main" id="{1FD26346-4474-471A-880D-77D2B3A06907}"/>
+              </a:ext>
+            </a:extLst>
+          </p:cNvPr>
+          <p:cNvSpPr>
+            <a:spLocks noGrp="1"/>
+          </p:cNvSpPr>
+          <p:nvPr>
+            <p:ph type="sldNum" sz="quarter" idx="10"/>
+          </p:nvPr>
+        </p:nvSpPr>
+        <p:spPr/>
+        <p:txBody>
+          <a:bodyPr/>
+          <a:lstStyle/>
+          <a:p>
+            <a:pPr>
+              <a:defRPr/>
+            </a:pPr>
+            <a:fld id="{9FF9BEAF-778C-7446-863C-7292389481CB}" type="slidenum">
+              <a:rPr lang="en-GB" noProof="0" smtClean="0"/>
+              <a:pPr>
+                <a:defRPr/>
+              </a:pPr>
+              <a:t>5</a:t>
+            </a:fld>
+            <a:endParaRPr lang="en-GB" noProof="0"/>
+          </a:p>
+        </p:txBody>
+      </p:sp>
+      <p:sp>
+        <p:nvSpPr>
+          <p:cNvPr id="5" name="Datumsplatzhalter 4">
+            <a:extLst>
+              <a:ext uri="{FF2B5EF4-FFF2-40B4-BE49-F238E27FC236}">
+                <a16:creationId xmlns:a16="http://schemas.microsoft.com/office/drawing/2014/main" id="{0B45531A-09CC-4712-B31D-D317DD7EDC02}"/>
+              </a:ext>
+            </a:extLst>
+          </p:cNvPr>
+          <p:cNvSpPr>
+            <a:spLocks noGrp="1"/>
+          </p:cNvSpPr>
+          <p:nvPr>
+            <p:ph type="dt" sz="half" idx="11"/>
+          </p:nvPr>
+        </p:nvSpPr>
+        <p:spPr/>
+        <p:txBody>
+          <a:bodyPr/>
+          <a:lstStyle/>
+          <a:p>
+            <a:pPr>
+              <a:defRPr/>
+            </a:pPr>
+            <a:fld id="{F36B4F74-2901-1B4A-A15E-8C1388FF047B}" type="datetime1">
+              <a:rPr lang="en-GB" noProof="0" smtClean="0"/>
+              <a:t>21/06/2020</a:t>
+            </a:fld>
+            <a:endParaRPr lang="en-GB" noProof="0"/>
+          </a:p>
+        </p:txBody>
+      </p:sp>
+      <p:sp>
+        <p:nvSpPr>
+          <p:cNvPr id="7" name="Bildplatzhalter 6">
+            <a:extLst>
+              <a:ext uri="{FF2B5EF4-FFF2-40B4-BE49-F238E27FC236}">
+                <a16:creationId xmlns:a16="http://schemas.microsoft.com/office/drawing/2014/main" id="{A7BE8A90-3F29-42A9-8816-809599D1543F}"/>
+              </a:ext>
+            </a:extLst>
+          </p:cNvPr>
+          <p:cNvSpPr>
+            <a:spLocks noGrp="1"/>
+          </p:cNvSpPr>
+          <p:nvPr>
+            <p:ph type="pic" sz="quarter" idx="12"/>
+          </p:nvPr>
+        </p:nvSpPr>
+        <p:spPr/>
+      </p:sp>
+      <p:sp>
+        <p:nvSpPr>
+          <p:cNvPr id="3" name="Titel 2">
+            <a:extLst>
+              <a:ext uri="{FF2B5EF4-FFF2-40B4-BE49-F238E27FC236}">
+                <a16:creationId xmlns:a16="http://schemas.microsoft.com/office/drawing/2014/main" id="{032EC43A-7E32-4543-AF9A-AD0B8248DBE5}"/>
+              </a:ext>
+            </a:extLst>
+          </p:cNvPr>
+          <p:cNvSpPr>
+            <a:spLocks noGrp="1"/>
+          </p:cNvSpPr>
+          <p:nvPr>
+            <p:ph type="title"/>
+          </p:nvPr>
+        </p:nvSpPr>
+        <p:spPr/>
+        <p:txBody>
+          <a:bodyPr/>
+          <a:lstStyle/>
+          <a:p>
+            <a:r>
+              <a:rPr lang="de-DE" dirty="0"/>
+              <a:t>Beschreibung der Daten</a:t>
+            </a:r>
+          </a:p>
+        </p:txBody>
+      </p:sp>
+    </p:spTree>
+    <p:extLst>
+      <p:ext uri="{BB962C8B-B14F-4D97-AF65-F5344CB8AC3E}">
+        <p14:creationId xmlns:p14="http://schemas.microsoft.com/office/powerpoint/2010/main" val="3090085059"/>
+      </p:ext>
+    </p:extLst>
+  </p:cSld>
+  <p:clrMapOvr>
+    <a:masterClrMapping/>
+  </p:clrMapOvr>
+</p:sld>
+</file>
+
+<file path=ppt/slides/slide6.xml><?xml version="1.0" encoding="utf-8"?>
+<p:sld xmlns:a="http://schemas.openxmlformats.org/drawingml/2006/main" xmlns:r="http://schemas.openxmlformats.org/officeDocument/2006/relationships" xmlns:p="http://schemas.openxmlformats.org/presentationml/2006/main">
+  <p:cSld>
+    <p:spTree>
+      <p:nvGrpSpPr>
+        <p:cNvPr id="1" name=""/>
+        <p:cNvGrpSpPr/>
+        <p:nvPr/>
+      </p:nvGrpSpPr>
+      <p:grpSpPr>
+        <a:xfrm>
+          <a:off x="0" y="0"/>
+          <a:ext cx="0" cy="0"/>
+          <a:chOff x="0" y="0"/>
+          <a:chExt cx="0" cy="0"/>
+        </a:xfrm>
+      </p:grpSpPr>
+      <p:sp>
+        <p:nvSpPr>
+          <p:cNvPr id="2" name="Inhaltsplatzhalter 1">
+            <a:extLst>
+              <a:ext uri="{FF2B5EF4-FFF2-40B4-BE49-F238E27FC236}">
+                <a16:creationId xmlns:a16="http://schemas.microsoft.com/office/drawing/2014/main" id="{27BB5563-8613-4E14-B8CE-3120EE0C034A}"/>
+              </a:ext>
+            </a:extLst>
+          </p:cNvPr>
+          <p:cNvSpPr>
+            <a:spLocks noGrp="1"/>
+          </p:cNvSpPr>
+          <p:nvPr>
+            <p:ph sz="quarter" idx="12"/>
+          </p:nvPr>
+        </p:nvSpPr>
+        <p:spPr>
+          <a:xfrm>
+            <a:off x="693339" y="1772816"/>
+            <a:ext cx="10780613" cy="2400267"/>
+          </a:xfrm>
+        </p:spPr>
+        <p:txBody>
+          <a:bodyPr/>
+          <a:lstStyle/>
+          <a:p>
+            <a:pPr>
+              <a:lnSpc>
+                <a:spcPct val="150000"/>
+              </a:lnSpc>
+              <a:buClr>
+                <a:schemeClr val="accent3"/>
+              </a:buClr>
+              <a:buFont typeface="Wingdings" panose="05000000000000000000" pitchFamily="2" charset="2"/>
+              <a:buChar char="ü"/>
+            </a:pPr>
+            <a:r>
+              <a:rPr lang="de-DE" sz="2400" dirty="0"/>
+              <a:t>Summe aller funktionalen Beträge innerhalb des Buchungsjournals ist 0</a:t>
+            </a:r>
+          </a:p>
+          <a:p>
+            <a:pPr>
+              <a:lnSpc>
+                <a:spcPct val="150000"/>
+              </a:lnSpc>
+              <a:buClr>
+                <a:schemeClr val="accent3"/>
+              </a:buClr>
+              <a:buFont typeface="Wingdings" panose="05000000000000000000" pitchFamily="2" charset="2"/>
+              <a:buChar char="ü"/>
+            </a:pPr>
+            <a:r>
+              <a:rPr lang="de-DE" sz="2400" dirty="0"/>
+              <a:t>Summen aller funktionalen Beträge innerhalb jedes Journaleintrags sind 0</a:t>
+            </a:r>
+          </a:p>
+          <a:p>
+            <a:pPr>
+              <a:lnSpc>
+                <a:spcPct val="150000"/>
+              </a:lnSpc>
+              <a:buClr>
+                <a:schemeClr val="accent3"/>
+              </a:buClr>
+              <a:buFont typeface="Wingdings" panose="05000000000000000000" pitchFamily="2" charset="2"/>
+              <a:buChar char="ü"/>
+            </a:pPr>
+            <a:r>
+              <a:rPr lang="de-DE" sz="2400" dirty="0"/>
+              <a:t>Anfangs- und Endsalden aller Konten stimmen zwischen Saldenliste und Buchungsjournal über ein</a:t>
+            </a:r>
+          </a:p>
+          <a:p>
+            <a:pPr>
+              <a:lnSpc>
+                <a:spcPct val="150000"/>
+              </a:lnSpc>
+              <a:buClr>
+                <a:schemeClr val="accent3"/>
+              </a:buClr>
+              <a:buFont typeface="Wingdings" panose="05000000000000000000" pitchFamily="2" charset="2"/>
+              <a:buChar char="ü"/>
+            </a:pPr>
+            <a:endParaRPr lang="de-DE" sz="2400" dirty="0"/>
+          </a:p>
+          <a:p>
+            <a:pPr>
+              <a:buClr>
+                <a:srgbClr val="00B050"/>
+              </a:buClr>
+              <a:buFont typeface="Wingdings" panose="05000000000000000000" pitchFamily="2" charset="2"/>
+              <a:buChar char="ü"/>
+            </a:pPr>
+            <a:endParaRPr lang="de-DE" sz="2400" dirty="0"/>
+          </a:p>
+          <a:p>
+            <a:pPr>
+              <a:buClr>
+                <a:srgbClr val="00B050"/>
+              </a:buClr>
+              <a:buFont typeface="Wingdings" panose="05000000000000000000" pitchFamily="2" charset="2"/>
+              <a:buChar char="ü"/>
+            </a:pPr>
+            <a:endParaRPr lang="de-DE" sz="2400" dirty="0"/>
+          </a:p>
+        </p:txBody>
+      </p:sp>
+      <p:sp>
+        <p:nvSpPr>
+          <p:cNvPr id="3" name="Titel 2">
+            <a:extLst>
+              <a:ext uri="{FF2B5EF4-FFF2-40B4-BE49-F238E27FC236}">
+                <a16:creationId xmlns:a16="http://schemas.microsoft.com/office/drawing/2014/main" id="{032EC43A-7E32-4543-AF9A-AD0B8248DBE5}"/>
+              </a:ext>
+            </a:extLst>
+          </p:cNvPr>
+          <p:cNvSpPr>
+            <a:spLocks noGrp="1"/>
+          </p:cNvSpPr>
+          <p:nvPr>
+            <p:ph type="title"/>
+          </p:nvPr>
+        </p:nvSpPr>
+        <p:spPr/>
+        <p:txBody>
+          <a:bodyPr/>
+          <a:lstStyle/>
+          <a:p>
+            <a:r>
+              <a:rPr lang="de-DE" dirty="0"/>
+              <a:t>Grundlegende Integritätschecks</a:t>
+            </a:r>
+          </a:p>
+        </p:txBody>
+      </p:sp>
+      <p:sp>
+        <p:nvSpPr>
+          <p:cNvPr id="4" name="Foliennummernplatzhalter 3">
+            <a:extLst>
+              <a:ext uri="{FF2B5EF4-FFF2-40B4-BE49-F238E27FC236}">
+                <a16:creationId xmlns:a16="http://schemas.microsoft.com/office/drawing/2014/main" id="{1FD26346-4474-471A-880D-77D2B3A06907}"/>
+              </a:ext>
+            </a:extLst>
+          </p:cNvPr>
+          <p:cNvSpPr>
+            <a:spLocks noGrp="1"/>
+          </p:cNvSpPr>
+          <p:nvPr>
+            <p:ph type="sldNum" sz="quarter" idx="4"/>
+          </p:nvPr>
+        </p:nvSpPr>
+        <p:spPr/>
+        <p:txBody>
+          <a:bodyPr/>
+          <a:lstStyle/>
+          <a:p>
+            <a:pPr>
+              <a:defRPr/>
+            </a:pPr>
+            <a:fld id="{9FF9BEAF-778C-7446-863C-7292389481CB}" type="slidenum">
+              <a:rPr lang="en-GB" noProof="0" smtClean="0"/>
+              <a:pPr>
+                <a:defRPr/>
+              </a:pPr>
+              <a:t>6</a:t>
+            </a:fld>
+            <a:endParaRPr lang="en-GB" noProof="0"/>
+          </a:p>
+        </p:txBody>
+      </p:sp>
+      <p:sp>
+        <p:nvSpPr>
+          <p:cNvPr id="5" name="Datumsplatzhalter 4">
+            <a:extLst>
+              <a:ext uri="{FF2B5EF4-FFF2-40B4-BE49-F238E27FC236}">
+                <a16:creationId xmlns:a16="http://schemas.microsoft.com/office/drawing/2014/main" id="{0B45531A-09CC-4712-B31D-D317DD7EDC02}"/>
+              </a:ext>
+            </a:extLst>
+          </p:cNvPr>
+          <p:cNvSpPr>
+            <a:spLocks noGrp="1"/>
+          </p:cNvSpPr>
+          <p:nvPr>
+            <p:ph type="dt" sz="half" idx="2"/>
+          </p:nvPr>
+        </p:nvSpPr>
+        <p:spPr/>
+        <p:txBody>
+          <a:bodyPr/>
+          <a:lstStyle/>
+          <a:p>
+            <a:pPr>
+              <a:defRPr/>
+            </a:pPr>
+            <a:fld id="{F36B4F74-2901-1B4A-A15E-8C1388FF047B}" type="datetime1">
+              <a:rPr lang="en-GB" noProof="0" smtClean="0"/>
+              <a:t>21/06/2020</a:t>
+            </a:fld>
+            <a:endParaRPr lang="en-GB" noProof="0"/>
+          </a:p>
+        </p:txBody>
+      </p:sp>
+      <p:sp>
+        <p:nvSpPr>
+          <p:cNvPr id="6" name="Inhaltsplatzhalter 1">
+            <a:extLst>
+              <a:ext uri="{FF2B5EF4-FFF2-40B4-BE49-F238E27FC236}">
+                <a16:creationId xmlns:a16="http://schemas.microsoft.com/office/drawing/2014/main" id="{E70E069E-F0F0-4260-BF72-F70B48A1B97B}"/>
               </a:ext>
             </a:extLst>
           </p:cNvPr>
@@ -12009,22 +12829,47 @@
           </p:cNvSpPr>
           <p:nvPr/>
         </p:nvSpPr>
-        <p:spPr>
+        <p:spPr bwMode="auto">
           <a:xfrm>
-            <a:off x="6327838" y="2264935"/>
-            <a:ext cx="5220000" cy="3543383"/>
+            <a:off x="700188" y="4365104"/>
+            <a:ext cx="10780613" cy="859227"/>
           </a:xfrm>
           <a:prstGeom prst="rect">
             <a:avLst/>
           </a:prstGeom>
-          <a:solidFill>
-            <a:schemeClr val="bg2">
-              <a:lumMod val="95000"/>
-            </a:schemeClr>
-          </a:solidFill>
+          <a:noFill/>
+          <a:ln>
+            <a:noFill/>
+          </a:ln>
+          <a:extLst>
+            <a:ext uri="{909E8E84-426E-40DD-AFC4-6F175D3DCCD1}">
+              <a14:hiddenFill xmlns:a14="http://schemas.microsoft.com/office/drawing/2010/main">
+                <a:solidFill>
+                  <a:srgbClr val="FFFFFF"/>
+                </a:solidFill>
+              </a14:hiddenFill>
+            </a:ext>
+            <a:ext uri="{91240B29-F687-4F45-9708-019B960494DF}">
+              <a14:hiddenLine xmlns:a14="http://schemas.microsoft.com/office/drawing/2010/main" w="9525">
+                <a:solidFill>
+                  <a:srgbClr val="000000"/>
+                </a:solidFill>
+                <a:miter lim="800000"/>
+                <a:headEnd/>
+                <a:tailEnd/>
+              </a14:hiddenLine>
+            </a:ext>
+            <a:ext uri="{FAA26D3D-D897-4be2-8F04-BA451C77F1D7}">
+              <ma14:placeholderFlag xmlns="" xmlns:ma14="http://schemas.microsoft.com/office/mac/drawingml/2011/main" val="1"/>
+            </a:ext>
+          </a:extLst>
         </p:spPr>
         <p:txBody>
-          <a:bodyPr anchor="ctr"/>
+          <a:bodyPr vert="horz" wrap="square" lIns="0" tIns="0" rIns="0" bIns="0" numCol="1" anchor="t" anchorCtr="0" compatLnSpc="1">
+            <a:prstTxWarp prst="textNoShape">
+              <a:avLst/>
+            </a:prstTxWarp>
+          </a:bodyPr>
           <a:lstStyle>
             <a:lvl1pPr marL="359824" indent="-359824" algn="l" rtl="0" eaLnBrk="1" fontAlgn="base" hangingPunct="1">
               <a:spcBef>
@@ -12202,232 +13047,47 @@
             </a:lvl9pPr>
           </a:lstStyle>
           <a:p>
-            <a:pPr marL="0" lvl="1" indent="0">
-              <a:buFont typeface="Arial" charset="0"/>
-              <a:buNone/>
+            <a:pPr>
+              <a:lnSpc>
+                <a:spcPct val="150000"/>
+              </a:lnSpc>
+              <a:buClr>
+                <a:schemeClr val="tx2"/>
+              </a:buClr>
+              <a:buFont typeface="Arial" panose="020B0604020202020204" pitchFamily="34" charset="0"/>
+              <a:buChar char="X"/>
             </a:pPr>
             <a:r>
-              <a:rPr lang="de-DE" sz="2000" kern="0" dirty="0">
-                <a:cs typeface="Arial"/>
-              </a:rPr>
-              <a:t>…</a:t>
+              <a:rPr lang="de-DE" sz="2400" kern="0" dirty="0"/>
+              <a:t>9 Journaleinträge mit lückenhaften Buchungszeilen</a:t>
             </a:r>
-            <a:endParaRPr lang="de-DE" sz="2000" kern="0" dirty="0"/>
           </a:p>
-        </p:txBody>
-      </p:sp>
-      <p:sp>
-        <p:nvSpPr>
-          <p:cNvPr id="8" name="Inhaltsplatzhalter 6">
-            <a:extLst>
-              <a:ext uri="{FF2B5EF4-FFF2-40B4-BE49-F238E27FC236}">
-                <a16:creationId xmlns:a16="http://schemas.microsoft.com/office/drawing/2014/main" id="{11B84CFB-5A2B-4ECE-B27C-2555BF6038BA}"/>
-              </a:ext>
-            </a:extLst>
-          </p:cNvPr>
-          <p:cNvSpPr txBox="1">
-            <a:spLocks/>
-          </p:cNvSpPr>
-          <p:nvPr/>
-        </p:nvSpPr>
-        <p:spPr>
-          <a:xfrm>
-            <a:off x="686419" y="2264935"/>
-            <a:ext cx="5220000" cy="3543383"/>
-          </a:xfrm>
-          <a:prstGeom prst="rect">
-            <a:avLst/>
-          </a:prstGeom>
-          <a:solidFill>
-            <a:schemeClr val="bg2">
-              <a:lumMod val="95000"/>
-            </a:schemeClr>
-          </a:solidFill>
-        </p:spPr>
-        <p:txBody>
-          <a:bodyPr anchor="ctr"/>
-          <a:lstStyle>
-            <a:defPPr>
-              <a:defRPr lang="de-DE"/>
-            </a:defPPr>
-            <a:lvl1pPr marL="359824" indent="-359824" eaLnBrk="1" hangingPunct="1">
-              <a:spcBef>
-                <a:spcPts val="533"/>
-              </a:spcBef>
+          <a:p>
+            <a:pPr>
               <a:buClr>
-                <a:schemeClr val="tx1"/>
+                <a:srgbClr val="00B050"/>
               </a:buClr>
-              <a:buFont typeface="Arial" charset="0"/>
-              <a:buChar char="•"/>
-              <a:tabLst/>
-              <a:defRPr sz="2133">
-                <a:solidFill>
-                  <a:schemeClr val="tx1"/>
-                </a:solidFill>
-                <a:latin typeface="+mn-lt"/>
-                <a:ea typeface="+mn-ea"/>
-                <a:cs typeface="+mn-cs"/>
-              </a:defRPr>
-            </a:lvl1pPr>
-            <a:lvl2pPr marL="352425" lvl="1" indent="-352425" eaLnBrk="1" hangingPunct="1">
-              <a:spcBef>
-                <a:spcPts val="533"/>
-              </a:spcBef>
+              <a:buFont typeface="Wingdings" panose="05000000000000000000" pitchFamily="2" charset="2"/>
+              <a:buChar char="ü"/>
+            </a:pPr>
+            <a:endParaRPr lang="de-DE" sz="2400" kern="0" dirty="0"/>
+          </a:p>
+          <a:p>
+            <a:pPr>
               <a:buClr>
-                <a:schemeClr val="accent3"/>
+                <a:srgbClr val="00B050"/>
               </a:buClr>
-              <a:buFont typeface="Arial" charset="0"/>
-              <a:buNone/>
-              <a:tabLst>
-                <a:tab pos="352425" algn="l"/>
-              </a:tabLst>
-              <a:defRPr sz="2000" kern="0">
-                <a:solidFill>
-                  <a:schemeClr val="tx1"/>
-                </a:solidFill>
-                <a:latin typeface="+mn-lt"/>
-                <a:ea typeface="+mn-ea"/>
-                <a:cs typeface="Arial"/>
-              </a:defRPr>
-            </a:lvl2pPr>
-            <a:lvl3pPr marL="1073124" indent="-359824" eaLnBrk="1" hangingPunct="1">
-              <a:spcBef>
-                <a:spcPts val="533"/>
-              </a:spcBef>
-              <a:buClr>
-                <a:schemeClr val="accent3"/>
-              </a:buClr>
-              <a:buFont typeface="Arial" charset="0"/>
-              <a:buChar char="•"/>
-              <a:tabLst/>
-              <a:defRPr sz="2133">
-                <a:solidFill>
-                  <a:schemeClr val="tx1"/>
-                </a:solidFill>
-                <a:latin typeface="+mn-lt"/>
-                <a:ea typeface="Geneva" pitchFamily="-107" charset="-128"/>
-                <a:cs typeface="Geneva" pitchFamily="-107" charset="-128"/>
-              </a:defRPr>
-            </a:lvl3pPr>
-            <a:lvl4pPr marL="1454113" indent="-380990" eaLnBrk="1" hangingPunct="1">
-              <a:spcBef>
-                <a:spcPts val="533"/>
-              </a:spcBef>
-              <a:buClr>
-                <a:schemeClr val="tx1"/>
-              </a:buClr>
-              <a:buFont typeface="Arial" charset="0"/>
-              <a:buChar char="•"/>
-              <a:tabLst/>
-              <a:defRPr sz="2133">
-                <a:solidFill>
-                  <a:schemeClr val="tx1"/>
-                </a:solidFill>
-                <a:latin typeface="+mn-lt"/>
-                <a:ea typeface="Geneva" pitchFamily="-107" charset="-128"/>
-                <a:cs typeface="Geneva" charset="0"/>
-              </a:defRPr>
-            </a:lvl4pPr>
-            <a:lvl5pPr marL="1807588" indent="-380990" eaLnBrk="1" hangingPunct="1">
-              <a:spcBef>
-                <a:spcPts val="533"/>
-              </a:spcBef>
-              <a:buClr>
-                <a:schemeClr val="tx1"/>
-              </a:buClr>
-              <a:buFont typeface="Arial" charset="0"/>
-              <a:buChar char="•"/>
-              <a:tabLst/>
-              <a:defRPr sz="2133">
-                <a:solidFill>
-                  <a:schemeClr val="tx1"/>
-                </a:solidFill>
-                <a:latin typeface="+mn-lt"/>
-                <a:ea typeface="Geneva" pitchFamily="-107" charset="-128"/>
-                <a:cs typeface="Geneva" charset="0"/>
-              </a:defRPr>
-            </a:lvl5pPr>
-            <a:lvl6pPr marL="3352716" indent="-304792" fontAlgn="base">
-              <a:spcBef>
-                <a:spcPct val="20000"/>
-              </a:spcBef>
-              <a:spcAft>
-                <a:spcPct val="0"/>
-              </a:spcAft>
-              <a:buChar char="»"/>
-              <a:defRPr>
-                <a:solidFill>
-                  <a:schemeClr val="tx1"/>
-                </a:solidFill>
-                <a:latin typeface="+mn-lt"/>
-                <a:ea typeface="+mn-ea"/>
-              </a:defRPr>
-            </a:lvl6pPr>
-            <a:lvl7pPr marL="3962301" indent="-304792" fontAlgn="base">
-              <a:spcBef>
-                <a:spcPct val="20000"/>
-              </a:spcBef>
-              <a:spcAft>
-                <a:spcPct val="0"/>
-              </a:spcAft>
-              <a:buChar char="»"/>
-              <a:defRPr>
-                <a:solidFill>
-                  <a:schemeClr val="tx1"/>
-                </a:solidFill>
-                <a:latin typeface="+mn-lt"/>
-                <a:ea typeface="+mn-ea"/>
-              </a:defRPr>
-            </a:lvl7pPr>
-            <a:lvl8pPr marL="4571886" indent="-304792" fontAlgn="base">
-              <a:spcBef>
-                <a:spcPct val="20000"/>
-              </a:spcBef>
-              <a:spcAft>
-                <a:spcPct val="0"/>
-              </a:spcAft>
-              <a:buChar char="»"/>
-              <a:defRPr>
-                <a:solidFill>
-                  <a:schemeClr val="tx1"/>
-                </a:solidFill>
-                <a:latin typeface="+mn-lt"/>
-                <a:ea typeface="+mn-ea"/>
-              </a:defRPr>
-            </a:lvl8pPr>
-            <a:lvl9pPr marL="5181470" indent="-304792" fontAlgn="base">
-              <a:spcBef>
-                <a:spcPct val="20000"/>
-              </a:spcBef>
-              <a:spcAft>
-                <a:spcPct val="0"/>
-              </a:spcAft>
-              <a:buChar char="»"/>
-              <a:defRPr>
-                <a:solidFill>
-                  <a:schemeClr val="tx1"/>
-                </a:solidFill>
-                <a:latin typeface="+mn-lt"/>
-                <a:ea typeface="+mn-ea"/>
-              </a:defRPr>
-            </a:lvl9pPr>
-          </a:lstStyle>
-          <a:p>
-            <a:pPr marL="0" indent="0">
-              <a:buNone/>
+              <a:buFont typeface="Wingdings" panose="05000000000000000000" pitchFamily="2" charset="2"/>
+              <a:buChar char="ü"/>
             </a:pPr>
-            <a:r>
-              <a:rPr lang="de-DE" sz="2000" dirty="0"/>
-              <a:t>…</a:t>
-            </a:r>
-            <a:endParaRPr lang="de-DE" dirty="0"/>
+            <a:endParaRPr lang="de-DE" sz="2400" kern="0" dirty="0"/>
           </a:p>
         </p:txBody>
       </p:sp>
     </p:spTree>
     <p:extLst>
       <p:ext uri="{BB962C8B-B14F-4D97-AF65-F5344CB8AC3E}">
-        <p14:creationId xmlns:p14="http://schemas.microsoft.com/office/powerpoint/2010/main" val="3727868739"/>
+        <p14:creationId xmlns:p14="http://schemas.microsoft.com/office/powerpoint/2010/main" val="2569831697"/>
       </p:ext>
     </p:extLst>
   </p:cSld>
@@ -12437,7 +13097,1429 @@
 </p:sld>
 </file>
 
-<file path=ppt/slides/slide4.xml><?xml version="1.0" encoding="utf-8"?>
+<file path=ppt/slides/slide7.xml><?xml version="1.0" encoding="utf-8"?>
+<p:sld xmlns:a="http://schemas.openxmlformats.org/drawingml/2006/main" xmlns:r="http://schemas.openxmlformats.org/officeDocument/2006/relationships" xmlns:p="http://schemas.openxmlformats.org/presentationml/2006/main">
+  <p:cSld>
+    <p:spTree>
+      <p:nvGrpSpPr>
+        <p:cNvPr id="1" name=""/>
+        <p:cNvGrpSpPr/>
+        <p:nvPr/>
+      </p:nvGrpSpPr>
+      <p:grpSpPr>
+        <a:xfrm>
+          <a:off x="0" y="0"/>
+          <a:ext cx="0" cy="0"/>
+          <a:chOff x="0" y="0"/>
+          <a:chExt cx="0" cy="0"/>
+        </a:xfrm>
+      </p:grpSpPr>
+      <p:sp>
+        <p:nvSpPr>
+          <p:cNvPr id="3" name="Titel 2">
+            <a:extLst>
+              <a:ext uri="{FF2B5EF4-FFF2-40B4-BE49-F238E27FC236}">
+                <a16:creationId xmlns:a16="http://schemas.microsoft.com/office/drawing/2014/main" id="{DC18805E-A5F9-4B44-B50C-9604780F2206}"/>
+              </a:ext>
+            </a:extLst>
+          </p:cNvPr>
+          <p:cNvSpPr>
+            <a:spLocks noGrp="1"/>
+          </p:cNvSpPr>
+          <p:nvPr>
+            <p:ph type="title"/>
+          </p:nvPr>
+        </p:nvSpPr>
+        <p:spPr/>
+        <p:txBody>
+          <a:bodyPr/>
+          <a:lstStyle/>
+          <a:p>
+            <a:r>
+              <a:rPr lang="de-DE" dirty="0"/>
+              <a:t>Grundlegende Integritätschecks</a:t>
+            </a:r>
+          </a:p>
+        </p:txBody>
+      </p:sp>
+      <p:sp>
+        <p:nvSpPr>
+          <p:cNvPr id="4" name="Foliennummernplatzhalter 3">
+            <a:extLst>
+              <a:ext uri="{FF2B5EF4-FFF2-40B4-BE49-F238E27FC236}">
+                <a16:creationId xmlns:a16="http://schemas.microsoft.com/office/drawing/2014/main" id="{105AD369-875A-42F3-B76E-43D028E99271}"/>
+              </a:ext>
+            </a:extLst>
+          </p:cNvPr>
+          <p:cNvSpPr>
+            <a:spLocks noGrp="1"/>
+          </p:cNvSpPr>
+          <p:nvPr>
+            <p:ph type="sldNum" sz="quarter" idx="4"/>
+          </p:nvPr>
+        </p:nvSpPr>
+        <p:spPr/>
+        <p:txBody>
+          <a:bodyPr/>
+          <a:lstStyle/>
+          <a:p>
+            <a:pPr>
+              <a:defRPr/>
+            </a:pPr>
+            <a:fld id="{9FF9BEAF-778C-7446-863C-7292389481CB}" type="slidenum">
+              <a:rPr lang="en-GB" noProof="0" smtClean="0"/>
+              <a:pPr>
+                <a:defRPr/>
+              </a:pPr>
+              <a:t>7</a:t>
+            </a:fld>
+            <a:endParaRPr lang="en-GB" noProof="0"/>
+          </a:p>
+        </p:txBody>
+      </p:sp>
+      <p:sp>
+        <p:nvSpPr>
+          <p:cNvPr id="5" name="Datumsplatzhalter 4">
+            <a:extLst>
+              <a:ext uri="{FF2B5EF4-FFF2-40B4-BE49-F238E27FC236}">
+                <a16:creationId xmlns:a16="http://schemas.microsoft.com/office/drawing/2014/main" id="{07732AB7-D308-4BEF-BD6C-37ECA57A10BB}"/>
+              </a:ext>
+            </a:extLst>
+          </p:cNvPr>
+          <p:cNvSpPr>
+            <a:spLocks noGrp="1"/>
+          </p:cNvSpPr>
+          <p:nvPr>
+            <p:ph type="dt" sz="half" idx="2"/>
+          </p:nvPr>
+        </p:nvSpPr>
+        <p:spPr/>
+        <p:txBody>
+          <a:bodyPr/>
+          <a:lstStyle/>
+          <a:p>
+            <a:pPr>
+              <a:defRPr/>
+            </a:pPr>
+            <a:fld id="{F36B4F74-2901-1B4A-A15E-8C1388FF047B}" type="datetime1">
+              <a:rPr lang="en-GB" noProof="0" smtClean="0"/>
+              <a:t>21/06/2020</a:t>
+            </a:fld>
+            <a:endParaRPr lang="en-GB" noProof="0"/>
+          </a:p>
+        </p:txBody>
+      </p:sp>
+      <p:graphicFrame>
+        <p:nvGraphicFramePr>
+          <p:cNvPr id="7" name="Tabelle 6">
+            <a:extLst>
+              <a:ext uri="{FF2B5EF4-FFF2-40B4-BE49-F238E27FC236}">
+                <a16:creationId xmlns:a16="http://schemas.microsoft.com/office/drawing/2014/main" id="{40D6D9CD-79EA-4F47-A5CB-112A9D1AB6C3}"/>
+              </a:ext>
+            </a:extLst>
+          </p:cNvPr>
+          <p:cNvGraphicFramePr>
+            <a:graphicFrameLocks noGrp="1"/>
+          </p:cNvGraphicFramePr>
+          <p:nvPr>
+            <p:extLst>
+              <p:ext uri="{D42A27DB-BD31-4B8C-83A1-F6EECF244321}">
+                <p14:modId xmlns:p14="http://schemas.microsoft.com/office/powerpoint/2010/main" val="2738827331"/>
+              </p:ext>
+            </p:extLst>
+          </p:nvPr>
+        </p:nvGraphicFramePr>
+        <p:xfrm>
+          <a:off x="704579" y="1381644"/>
+          <a:ext cx="8361132" cy="4824531"/>
+        </p:xfrm>
+        <a:graphic>
+          <a:graphicData uri="http://schemas.openxmlformats.org/drawingml/2006/table">
+            <a:tbl>
+              <a:tblPr firstRow="1" firstCol="1" bandRow="1">
+                <a:tableStyleId>{F2DE63D5-997A-4646-A377-4702673A728D}</a:tableStyleId>
+              </a:tblPr>
+              <a:tblGrid>
+                <a:gridCol w="3128380">
+                  <a:extLst>
+                    <a:ext uri="{9D8B030D-6E8A-4147-A177-3AD203B41FA5}">
+                      <a16:colId xmlns:a16="http://schemas.microsoft.com/office/drawing/2014/main" val="2288175848"/>
+                    </a:ext>
+                  </a:extLst>
+                </a:gridCol>
+                <a:gridCol w="2616376">
+                  <a:extLst>
+                    <a:ext uri="{9D8B030D-6E8A-4147-A177-3AD203B41FA5}">
+                      <a16:colId xmlns:a16="http://schemas.microsoft.com/office/drawing/2014/main" val="271387279"/>
+                    </a:ext>
+                  </a:extLst>
+                </a:gridCol>
+                <a:gridCol w="2616376">
+                  <a:extLst>
+                    <a:ext uri="{9D8B030D-6E8A-4147-A177-3AD203B41FA5}">
+                      <a16:colId xmlns:a16="http://schemas.microsoft.com/office/drawing/2014/main" val="1393273697"/>
+                    </a:ext>
+                  </a:extLst>
+                </a:gridCol>
+              </a:tblGrid>
+              <a:tr h="689220">
+                <a:tc>
+                  <a:txBody>
+                    <a:bodyPr/>
+                    <a:lstStyle/>
+                    <a:p>
+                      <a:pPr>
+                        <a:lnSpc>
+                          <a:spcPts val="1300"/>
+                        </a:lnSpc>
+                        <a:spcAft>
+                          <a:spcPts val="0"/>
+                        </a:spcAft>
+                      </a:pPr>
+                      <a:r>
+                        <a:rPr lang="de-AT" sz="1600" dirty="0">
+                          <a:effectLst/>
+                        </a:rPr>
+                        <a:t>JE-Nummer</a:t>
+                      </a:r>
+                      <a:endParaRPr lang="de-DE" sz="1600" dirty="0">
+                        <a:solidFill>
+                          <a:srgbClr val="000000"/>
+                        </a:solidFill>
+                        <a:effectLst/>
+                        <a:latin typeface="Arial" panose="020B0604020202020204" pitchFamily="34" charset="0"/>
+                        <a:ea typeface="Cambria" panose="02040503050406030204" pitchFamily="18" charset="0"/>
+                        <a:cs typeface="Times New Roman" panose="02020603050405020304" pitchFamily="18" charset="0"/>
+                      </a:endParaRPr>
+                    </a:p>
+                  </a:txBody>
+                  <a:tcPr marL="63500" marR="63500" marT="0" marB="0" anchor="ctr"/>
+                </a:tc>
+                <a:tc>
+                  <a:txBody>
+                    <a:bodyPr/>
+                    <a:lstStyle/>
+                    <a:p>
+                      <a:pPr algn="ctr">
+                        <a:lnSpc>
+                          <a:spcPts val="1300"/>
+                        </a:lnSpc>
+                        <a:spcAft>
+                          <a:spcPts val="0"/>
+                        </a:spcAft>
+                      </a:pPr>
+                      <a:r>
+                        <a:rPr lang="de-AT" sz="1600">
+                          <a:effectLst/>
+                        </a:rPr>
+                        <a:t>Tatsächliche Anzahl an Zeilen</a:t>
+                      </a:r>
+                      <a:endParaRPr lang="de-DE" sz="1600">
+                        <a:solidFill>
+                          <a:srgbClr val="000000"/>
+                        </a:solidFill>
+                        <a:effectLst/>
+                        <a:latin typeface="Arial" panose="020B0604020202020204" pitchFamily="34" charset="0"/>
+                        <a:ea typeface="Cambria" panose="02040503050406030204" pitchFamily="18" charset="0"/>
+                        <a:cs typeface="Times New Roman" panose="02020603050405020304" pitchFamily="18" charset="0"/>
+                      </a:endParaRPr>
+                    </a:p>
+                  </a:txBody>
+                  <a:tcPr marL="63500" marR="63500" marT="0" marB="0" anchor="ctr"/>
+                </a:tc>
+                <a:tc>
+                  <a:txBody>
+                    <a:bodyPr/>
+                    <a:lstStyle/>
+                    <a:p>
+                      <a:pPr algn="ctr">
+                        <a:lnSpc>
+                          <a:spcPts val="1300"/>
+                        </a:lnSpc>
+                        <a:spcAft>
+                          <a:spcPts val="0"/>
+                        </a:spcAft>
+                      </a:pPr>
+                      <a:r>
+                        <a:rPr lang="de-AT" sz="1600">
+                          <a:effectLst/>
+                        </a:rPr>
+                        <a:t>Erwartete Anzahl an Zeilen</a:t>
+                      </a:r>
+                      <a:endParaRPr lang="de-DE" sz="1600">
+                        <a:solidFill>
+                          <a:srgbClr val="000000"/>
+                        </a:solidFill>
+                        <a:effectLst/>
+                        <a:latin typeface="Arial" panose="020B0604020202020204" pitchFamily="34" charset="0"/>
+                        <a:ea typeface="Cambria" panose="02040503050406030204" pitchFamily="18" charset="0"/>
+                        <a:cs typeface="Times New Roman" panose="02020603050405020304" pitchFamily="18" charset="0"/>
+                      </a:endParaRPr>
+                    </a:p>
+                  </a:txBody>
+                  <a:tcPr marL="63500" marR="63500" marT="0" marB="0" anchor="ctr"/>
+                </a:tc>
+                <a:extLst>
+                  <a:ext uri="{0D108BD9-81ED-4DB2-BD59-A6C34878D82A}">
+                    <a16:rowId xmlns:a16="http://schemas.microsoft.com/office/drawing/2014/main" val="4128956783"/>
+                  </a:ext>
+                </a:extLst>
+              </a:tr>
+              <a:tr h="459479">
+                <a:tc>
+                  <a:txBody>
+                    <a:bodyPr/>
+                    <a:lstStyle/>
+                    <a:p>
+                      <a:pPr>
+                        <a:lnSpc>
+                          <a:spcPts val="1300"/>
+                        </a:lnSpc>
+                        <a:spcAft>
+                          <a:spcPts val="0"/>
+                        </a:spcAft>
+                      </a:pPr>
+                      <a:r>
+                        <a:rPr lang="de-DE" sz="1600">
+                          <a:effectLst/>
+                        </a:rPr>
+                        <a:t>2014-0001-2400008088        </a:t>
+                      </a:r>
+                      <a:endParaRPr lang="de-DE" sz="1600">
+                        <a:solidFill>
+                          <a:srgbClr val="000000"/>
+                        </a:solidFill>
+                        <a:effectLst/>
+                        <a:latin typeface="Arial" panose="020B0604020202020204" pitchFamily="34" charset="0"/>
+                        <a:ea typeface="Cambria" panose="02040503050406030204" pitchFamily="18" charset="0"/>
+                        <a:cs typeface="Times New Roman" panose="02020603050405020304" pitchFamily="18" charset="0"/>
+                      </a:endParaRPr>
+                    </a:p>
+                  </a:txBody>
+                  <a:tcPr marL="63500" marR="63500" marT="0" marB="0" anchor="ctr"/>
+                </a:tc>
+                <a:tc>
+                  <a:txBody>
+                    <a:bodyPr/>
+                    <a:lstStyle/>
+                    <a:p>
+                      <a:pPr algn="ctr">
+                        <a:lnSpc>
+                          <a:spcPts val="1300"/>
+                        </a:lnSpc>
+                        <a:spcAft>
+                          <a:spcPts val="0"/>
+                        </a:spcAft>
+                      </a:pPr>
+                      <a:r>
+                        <a:rPr lang="de-DE" sz="1600">
+                          <a:effectLst/>
+                        </a:rPr>
+                        <a:t>4         </a:t>
+                      </a:r>
+                      <a:endParaRPr lang="de-DE" sz="1600">
+                        <a:solidFill>
+                          <a:srgbClr val="000000"/>
+                        </a:solidFill>
+                        <a:effectLst/>
+                        <a:latin typeface="Arial" panose="020B0604020202020204" pitchFamily="34" charset="0"/>
+                        <a:ea typeface="Cambria" panose="02040503050406030204" pitchFamily="18" charset="0"/>
+                        <a:cs typeface="Times New Roman" panose="02020603050405020304" pitchFamily="18" charset="0"/>
+                      </a:endParaRPr>
+                    </a:p>
+                  </a:txBody>
+                  <a:tcPr marL="63500" marR="63500" marT="0" marB="0" anchor="ctr"/>
+                </a:tc>
+                <a:tc>
+                  <a:txBody>
+                    <a:bodyPr/>
+                    <a:lstStyle/>
+                    <a:p>
+                      <a:pPr algn="ctr">
+                        <a:lnSpc>
+                          <a:spcPts val="1300"/>
+                        </a:lnSpc>
+                        <a:spcAft>
+                          <a:spcPts val="0"/>
+                        </a:spcAft>
+                      </a:pPr>
+                      <a:r>
+                        <a:rPr lang="de-DE" sz="1600">
+                          <a:effectLst/>
+                        </a:rPr>
+                        <a:t>8</a:t>
+                      </a:r>
+                      <a:endParaRPr lang="de-DE" sz="1600">
+                        <a:solidFill>
+                          <a:srgbClr val="000000"/>
+                        </a:solidFill>
+                        <a:effectLst/>
+                        <a:latin typeface="Arial" panose="020B0604020202020204" pitchFamily="34" charset="0"/>
+                        <a:ea typeface="Cambria" panose="02040503050406030204" pitchFamily="18" charset="0"/>
+                        <a:cs typeface="Times New Roman" panose="02020603050405020304" pitchFamily="18" charset="0"/>
+                      </a:endParaRPr>
+                    </a:p>
+                  </a:txBody>
+                  <a:tcPr marL="63500" marR="63500" marT="0" marB="0" anchor="ctr"/>
+                </a:tc>
+                <a:extLst>
+                  <a:ext uri="{0D108BD9-81ED-4DB2-BD59-A6C34878D82A}">
+                    <a16:rowId xmlns:a16="http://schemas.microsoft.com/office/drawing/2014/main" val="771050915"/>
+                  </a:ext>
+                </a:extLst>
+              </a:tr>
+              <a:tr h="459479">
+                <a:tc>
+                  <a:txBody>
+                    <a:bodyPr/>
+                    <a:lstStyle/>
+                    <a:p>
+                      <a:pPr>
+                        <a:lnSpc>
+                          <a:spcPts val="1300"/>
+                        </a:lnSpc>
+                        <a:spcAft>
+                          <a:spcPts val="0"/>
+                        </a:spcAft>
+                      </a:pPr>
+                      <a:r>
+                        <a:rPr lang="de-DE" sz="1600">
+                          <a:effectLst/>
+                        </a:rPr>
+                        <a:t>2014-0001-2400013762 </a:t>
+                      </a:r>
+                      <a:endParaRPr lang="de-DE" sz="1600">
+                        <a:solidFill>
+                          <a:srgbClr val="000000"/>
+                        </a:solidFill>
+                        <a:effectLst/>
+                        <a:latin typeface="Arial" panose="020B0604020202020204" pitchFamily="34" charset="0"/>
+                        <a:ea typeface="Cambria" panose="02040503050406030204" pitchFamily="18" charset="0"/>
+                        <a:cs typeface="Times New Roman" panose="02020603050405020304" pitchFamily="18" charset="0"/>
+                      </a:endParaRPr>
+                    </a:p>
+                  </a:txBody>
+                  <a:tcPr marL="63500" marR="63500" marT="0" marB="0" anchor="ctr"/>
+                </a:tc>
+                <a:tc>
+                  <a:txBody>
+                    <a:bodyPr/>
+                    <a:lstStyle/>
+                    <a:p>
+                      <a:pPr algn="ctr">
+                        <a:lnSpc>
+                          <a:spcPts val="1300"/>
+                        </a:lnSpc>
+                        <a:spcAft>
+                          <a:spcPts val="0"/>
+                        </a:spcAft>
+                      </a:pPr>
+                      <a:r>
+                        <a:rPr lang="de-DE" sz="1600">
+                          <a:effectLst/>
+                        </a:rPr>
+                        <a:t>4        </a:t>
+                      </a:r>
+                      <a:endParaRPr lang="de-DE" sz="1600">
+                        <a:solidFill>
+                          <a:srgbClr val="000000"/>
+                        </a:solidFill>
+                        <a:effectLst/>
+                        <a:latin typeface="Arial" panose="020B0604020202020204" pitchFamily="34" charset="0"/>
+                        <a:ea typeface="Cambria" panose="02040503050406030204" pitchFamily="18" charset="0"/>
+                        <a:cs typeface="Times New Roman" panose="02020603050405020304" pitchFamily="18" charset="0"/>
+                      </a:endParaRPr>
+                    </a:p>
+                  </a:txBody>
+                  <a:tcPr marL="63500" marR="63500" marT="0" marB="0" anchor="ctr"/>
+                </a:tc>
+                <a:tc>
+                  <a:txBody>
+                    <a:bodyPr/>
+                    <a:lstStyle/>
+                    <a:p>
+                      <a:pPr algn="ctr">
+                        <a:lnSpc>
+                          <a:spcPts val="1300"/>
+                        </a:lnSpc>
+                        <a:spcAft>
+                          <a:spcPts val="0"/>
+                        </a:spcAft>
+                      </a:pPr>
+                      <a:r>
+                        <a:rPr lang="de-DE" sz="1600">
+                          <a:effectLst/>
+                        </a:rPr>
+                        <a:t>8</a:t>
+                      </a:r>
+                      <a:endParaRPr lang="de-DE" sz="1600">
+                        <a:solidFill>
+                          <a:srgbClr val="000000"/>
+                        </a:solidFill>
+                        <a:effectLst/>
+                        <a:latin typeface="Arial" panose="020B0604020202020204" pitchFamily="34" charset="0"/>
+                        <a:ea typeface="Cambria" panose="02040503050406030204" pitchFamily="18" charset="0"/>
+                        <a:cs typeface="Times New Roman" panose="02020603050405020304" pitchFamily="18" charset="0"/>
+                      </a:endParaRPr>
+                    </a:p>
+                  </a:txBody>
+                  <a:tcPr marL="63500" marR="63500" marT="0" marB="0" anchor="ctr"/>
+                </a:tc>
+                <a:extLst>
+                  <a:ext uri="{0D108BD9-81ED-4DB2-BD59-A6C34878D82A}">
+                    <a16:rowId xmlns:a16="http://schemas.microsoft.com/office/drawing/2014/main" val="2416427264"/>
+                  </a:ext>
+                </a:extLst>
+              </a:tr>
+              <a:tr h="459479">
+                <a:tc>
+                  <a:txBody>
+                    <a:bodyPr/>
+                    <a:lstStyle/>
+                    <a:p>
+                      <a:pPr>
+                        <a:lnSpc>
+                          <a:spcPts val="1300"/>
+                        </a:lnSpc>
+                        <a:spcAft>
+                          <a:spcPts val="0"/>
+                        </a:spcAft>
+                      </a:pPr>
+                      <a:r>
+                        <a:rPr lang="de-DE" sz="1600">
+                          <a:effectLst/>
+                        </a:rPr>
+                        <a:t>2014-0001-4200036317</a:t>
+                      </a:r>
+                      <a:endParaRPr lang="de-DE" sz="1600">
+                        <a:solidFill>
+                          <a:srgbClr val="000000"/>
+                        </a:solidFill>
+                        <a:effectLst/>
+                        <a:latin typeface="Arial" panose="020B0604020202020204" pitchFamily="34" charset="0"/>
+                        <a:ea typeface="Cambria" panose="02040503050406030204" pitchFamily="18" charset="0"/>
+                        <a:cs typeface="Times New Roman" panose="02020603050405020304" pitchFamily="18" charset="0"/>
+                      </a:endParaRPr>
+                    </a:p>
+                  </a:txBody>
+                  <a:tcPr marL="63500" marR="63500" marT="0" marB="0" anchor="ctr"/>
+                </a:tc>
+                <a:tc>
+                  <a:txBody>
+                    <a:bodyPr/>
+                    <a:lstStyle/>
+                    <a:p>
+                      <a:pPr algn="ctr">
+                        <a:lnSpc>
+                          <a:spcPts val="1300"/>
+                        </a:lnSpc>
+                        <a:spcAft>
+                          <a:spcPts val="0"/>
+                        </a:spcAft>
+                      </a:pPr>
+                      <a:r>
+                        <a:rPr lang="de-DE" sz="1600">
+                          <a:effectLst/>
+                        </a:rPr>
+                        <a:t>2         </a:t>
+                      </a:r>
+                      <a:endParaRPr lang="de-DE" sz="1600">
+                        <a:solidFill>
+                          <a:srgbClr val="000000"/>
+                        </a:solidFill>
+                        <a:effectLst/>
+                        <a:latin typeface="Arial" panose="020B0604020202020204" pitchFamily="34" charset="0"/>
+                        <a:ea typeface="Cambria" panose="02040503050406030204" pitchFamily="18" charset="0"/>
+                        <a:cs typeface="Times New Roman" panose="02020603050405020304" pitchFamily="18" charset="0"/>
+                      </a:endParaRPr>
+                    </a:p>
+                  </a:txBody>
+                  <a:tcPr marL="63500" marR="63500" marT="0" marB="0" anchor="ctr"/>
+                </a:tc>
+                <a:tc>
+                  <a:txBody>
+                    <a:bodyPr/>
+                    <a:lstStyle/>
+                    <a:p>
+                      <a:pPr algn="ctr">
+                        <a:lnSpc>
+                          <a:spcPts val="1300"/>
+                        </a:lnSpc>
+                        <a:spcAft>
+                          <a:spcPts val="0"/>
+                        </a:spcAft>
+                      </a:pPr>
+                      <a:r>
+                        <a:rPr lang="de-DE" sz="1600">
+                          <a:effectLst/>
+                        </a:rPr>
+                        <a:t>3</a:t>
+                      </a:r>
+                      <a:endParaRPr lang="de-DE" sz="1600">
+                        <a:solidFill>
+                          <a:srgbClr val="000000"/>
+                        </a:solidFill>
+                        <a:effectLst/>
+                        <a:latin typeface="Arial" panose="020B0604020202020204" pitchFamily="34" charset="0"/>
+                        <a:ea typeface="Cambria" panose="02040503050406030204" pitchFamily="18" charset="0"/>
+                        <a:cs typeface="Times New Roman" panose="02020603050405020304" pitchFamily="18" charset="0"/>
+                      </a:endParaRPr>
+                    </a:p>
+                  </a:txBody>
+                  <a:tcPr marL="63500" marR="63500" marT="0" marB="0" anchor="ctr"/>
+                </a:tc>
+                <a:extLst>
+                  <a:ext uri="{0D108BD9-81ED-4DB2-BD59-A6C34878D82A}">
+                    <a16:rowId xmlns:a16="http://schemas.microsoft.com/office/drawing/2014/main" val="2948774197"/>
+                  </a:ext>
+                </a:extLst>
+              </a:tr>
+              <a:tr h="459479">
+                <a:tc>
+                  <a:txBody>
+                    <a:bodyPr/>
+                    <a:lstStyle/>
+                    <a:p>
+                      <a:pPr>
+                        <a:lnSpc>
+                          <a:spcPts val="1300"/>
+                        </a:lnSpc>
+                        <a:spcAft>
+                          <a:spcPts val="0"/>
+                        </a:spcAft>
+                      </a:pPr>
+                      <a:r>
+                        <a:rPr lang="de-DE" sz="1600">
+                          <a:effectLst/>
+                        </a:rPr>
+                        <a:t>2014-0001-4200036320      </a:t>
+                      </a:r>
+                      <a:endParaRPr lang="de-DE" sz="1600">
+                        <a:solidFill>
+                          <a:srgbClr val="000000"/>
+                        </a:solidFill>
+                        <a:effectLst/>
+                        <a:latin typeface="Arial" panose="020B0604020202020204" pitchFamily="34" charset="0"/>
+                        <a:ea typeface="Cambria" panose="02040503050406030204" pitchFamily="18" charset="0"/>
+                        <a:cs typeface="Times New Roman" panose="02020603050405020304" pitchFamily="18" charset="0"/>
+                      </a:endParaRPr>
+                    </a:p>
+                  </a:txBody>
+                  <a:tcPr marL="63500" marR="63500" marT="0" marB="0" anchor="ctr"/>
+                </a:tc>
+                <a:tc>
+                  <a:txBody>
+                    <a:bodyPr/>
+                    <a:lstStyle/>
+                    <a:p>
+                      <a:pPr algn="ctr">
+                        <a:lnSpc>
+                          <a:spcPts val="1300"/>
+                        </a:lnSpc>
+                        <a:spcAft>
+                          <a:spcPts val="0"/>
+                        </a:spcAft>
+                      </a:pPr>
+                      <a:r>
+                        <a:rPr lang="de-DE" sz="1600">
+                          <a:effectLst/>
+                        </a:rPr>
+                        <a:t>2        </a:t>
+                      </a:r>
+                      <a:endParaRPr lang="de-DE" sz="1600">
+                        <a:solidFill>
+                          <a:srgbClr val="000000"/>
+                        </a:solidFill>
+                        <a:effectLst/>
+                        <a:latin typeface="Arial" panose="020B0604020202020204" pitchFamily="34" charset="0"/>
+                        <a:ea typeface="Cambria" panose="02040503050406030204" pitchFamily="18" charset="0"/>
+                        <a:cs typeface="Times New Roman" panose="02020603050405020304" pitchFamily="18" charset="0"/>
+                      </a:endParaRPr>
+                    </a:p>
+                  </a:txBody>
+                  <a:tcPr marL="63500" marR="63500" marT="0" marB="0" anchor="ctr"/>
+                </a:tc>
+                <a:tc>
+                  <a:txBody>
+                    <a:bodyPr/>
+                    <a:lstStyle/>
+                    <a:p>
+                      <a:pPr algn="ctr">
+                        <a:lnSpc>
+                          <a:spcPts val="1300"/>
+                        </a:lnSpc>
+                        <a:spcAft>
+                          <a:spcPts val="0"/>
+                        </a:spcAft>
+                      </a:pPr>
+                      <a:r>
+                        <a:rPr lang="de-DE" sz="1600">
+                          <a:effectLst/>
+                        </a:rPr>
+                        <a:t>3</a:t>
+                      </a:r>
+                      <a:endParaRPr lang="de-DE" sz="1600">
+                        <a:solidFill>
+                          <a:srgbClr val="000000"/>
+                        </a:solidFill>
+                        <a:effectLst/>
+                        <a:latin typeface="Arial" panose="020B0604020202020204" pitchFamily="34" charset="0"/>
+                        <a:ea typeface="Cambria" panose="02040503050406030204" pitchFamily="18" charset="0"/>
+                        <a:cs typeface="Times New Roman" panose="02020603050405020304" pitchFamily="18" charset="0"/>
+                      </a:endParaRPr>
+                    </a:p>
+                  </a:txBody>
+                  <a:tcPr marL="63500" marR="63500" marT="0" marB="0" anchor="ctr"/>
+                </a:tc>
+                <a:extLst>
+                  <a:ext uri="{0D108BD9-81ED-4DB2-BD59-A6C34878D82A}">
+                    <a16:rowId xmlns:a16="http://schemas.microsoft.com/office/drawing/2014/main" val="2294631274"/>
+                  </a:ext>
+                </a:extLst>
+              </a:tr>
+              <a:tr h="459479">
+                <a:tc>
+                  <a:txBody>
+                    <a:bodyPr/>
+                    <a:lstStyle/>
+                    <a:p>
+                      <a:pPr>
+                        <a:lnSpc>
+                          <a:spcPts val="1300"/>
+                        </a:lnSpc>
+                        <a:spcAft>
+                          <a:spcPts val="0"/>
+                        </a:spcAft>
+                      </a:pPr>
+                      <a:r>
+                        <a:rPr lang="de-DE" sz="1600">
+                          <a:effectLst/>
+                        </a:rPr>
+                        <a:t>2014-0001-4200036323       </a:t>
+                      </a:r>
+                      <a:endParaRPr lang="de-DE" sz="1600">
+                        <a:solidFill>
+                          <a:srgbClr val="000000"/>
+                        </a:solidFill>
+                        <a:effectLst/>
+                        <a:latin typeface="Arial" panose="020B0604020202020204" pitchFamily="34" charset="0"/>
+                        <a:ea typeface="Cambria" panose="02040503050406030204" pitchFamily="18" charset="0"/>
+                        <a:cs typeface="Times New Roman" panose="02020603050405020304" pitchFamily="18" charset="0"/>
+                      </a:endParaRPr>
+                    </a:p>
+                  </a:txBody>
+                  <a:tcPr marL="63500" marR="63500" marT="0" marB="0" anchor="ctr"/>
+                </a:tc>
+                <a:tc>
+                  <a:txBody>
+                    <a:bodyPr/>
+                    <a:lstStyle/>
+                    <a:p>
+                      <a:pPr algn="ctr">
+                        <a:lnSpc>
+                          <a:spcPts val="1300"/>
+                        </a:lnSpc>
+                        <a:spcAft>
+                          <a:spcPts val="0"/>
+                        </a:spcAft>
+                      </a:pPr>
+                      <a:r>
+                        <a:rPr lang="de-DE" sz="1600">
+                          <a:effectLst/>
+                        </a:rPr>
+                        <a:t>2        </a:t>
+                      </a:r>
+                      <a:endParaRPr lang="de-DE" sz="1600">
+                        <a:solidFill>
+                          <a:srgbClr val="000000"/>
+                        </a:solidFill>
+                        <a:effectLst/>
+                        <a:latin typeface="Arial" panose="020B0604020202020204" pitchFamily="34" charset="0"/>
+                        <a:ea typeface="Cambria" panose="02040503050406030204" pitchFamily="18" charset="0"/>
+                        <a:cs typeface="Times New Roman" panose="02020603050405020304" pitchFamily="18" charset="0"/>
+                      </a:endParaRPr>
+                    </a:p>
+                  </a:txBody>
+                  <a:tcPr marL="63500" marR="63500" marT="0" marB="0" anchor="ctr"/>
+                </a:tc>
+                <a:tc>
+                  <a:txBody>
+                    <a:bodyPr/>
+                    <a:lstStyle/>
+                    <a:p>
+                      <a:pPr algn="ctr">
+                        <a:lnSpc>
+                          <a:spcPts val="1300"/>
+                        </a:lnSpc>
+                        <a:spcAft>
+                          <a:spcPts val="0"/>
+                        </a:spcAft>
+                      </a:pPr>
+                      <a:r>
+                        <a:rPr lang="de-DE" sz="1600">
+                          <a:effectLst/>
+                        </a:rPr>
+                        <a:t>3</a:t>
+                      </a:r>
+                      <a:endParaRPr lang="de-DE" sz="1600">
+                        <a:solidFill>
+                          <a:srgbClr val="000000"/>
+                        </a:solidFill>
+                        <a:effectLst/>
+                        <a:latin typeface="Arial" panose="020B0604020202020204" pitchFamily="34" charset="0"/>
+                        <a:ea typeface="Cambria" panose="02040503050406030204" pitchFamily="18" charset="0"/>
+                        <a:cs typeface="Times New Roman" panose="02020603050405020304" pitchFamily="18" charset="0"/>
+                      </a:endParaRPr>
+                    </a:p>
+                  </a:txBody>
+                  <a:tcPr marL="63500" marR="63500" marT="0" marB="0" anchor="ctr"/>
+                </a:tc>
+                <a:extLst>
+                  <a:ext uri="{0D108BD9-81ED-4DB2-BD59-A6C34878D82A}">
+                    <a16:rowId xmlns:a16="http://schemas.microsoft.com/office/drawing/2014/main" val="91468747"/>
+                  </a:ext>
+                </a:extLst>
+              </a:tr>
+              <a:tr h="459479">
+                <a:tc>
+                  <a:txBody>
+                    <a:bodyPr/>
+                    <a:lstStyle/>
+                    <a:p>
+                      <a:pPr>
+                        <a:lnSpc>
+                          <a:spcPts val="1300"/>
+                        </a:lnSpc>
+                        <a:spcAft>
+                          <a:spcPts val="0"/>
+                        </a:spcAft>
+                      </a:pPr>
+                      <a:r>
+                        <a:rPr lang="de-DE" sz="1600">
+                          <a:effectLst/>
+                        </a:rPr>
+                        <a:t>2014-0001-4200036332       </a:t>
+                      </a:r>
+                      <a:endParaRPr lang="de-DE" sz="1600">
+                        <a:solidFill>
+                          <a:srgbClr val="000000"/>
+                        </a:solidFill>
+                        <a:effectLst/>
+                        <a:latin typeface="Arial" panose="020B0604020202020204" pitchFamily="34" charset="0"/>
+                        <a:ea typeface="Cambria" panose="02040503050406030204" pitchFamily="18" charset="0"/>
+                        <a:cs typeface="Times New Roman" panose="02020603050405020304" pitchFamily="18" charset="0"/>
+                      </a:endParaRPr>
+                    </a:p>
+                  </a:txBody>
+                  <a:tcPr marL="63500" marR="63500" marT="0" marB="0" anchor="ctr"/>
+                </a:tc>
+                <a:tc>
+                  <a:txBody>
+                    <a:bodyPr/>
+                    <a:lstStyle/>
+                    <a:p>
+                      <a:pPr algn="ctr">
+                        <a:lnSpc>
+                          <a:spcPts val="1300"/>
+                        </a:lnSpc>
+                        <a:spcAft>
+                          <a:spcPts val="0"/>
+                        </a:spcAft>
+                      </a:pPr>
+                      <a:r>
+                        <a:rPr lang="de-DE" sz="1600">
+                          <a:effectLst/>
+                        </a:rPr>
+                        <a:t>2         </a:t>
+                      </a:r>
+                      <a:endParaRPr lang="de-DE" sz="1600">
+                        <a:solidFill>
+                          <a:srgbClr val="000000"/>
+                        </a:solidFill>
+                        <a:effectLst/>
+                        <a:latin typeface="Arial" panose="020B0604020202020204" pitchFamily="34" charset="0"/>
+                        <a:ea typeface="Cambria" panose="02040503050406030204" pitchFamily="18" charset="0"/>
+                        <a:cs typeface="Times New Roman" panose="02020603050405020304" pitchFamily="18" charset="0"/>
+                      </a:endParaRPr>
+                    </a:p>
+                  </a:txBody>
+                  <a:tcPr marL="63500" marR="63500" marT="0" marB="0" anchor="ctr"/>
+                </a:tc>
+                <a:tc>
+                  <a:txBody>
+                    <a:bodyPr/>
+                    <a:lstStyle/>
+                    <a:p>
+                      <a:pPr algn="ctr">
+                        <a:lnSpc>
+                          <a:spcPts val="1300"/>
+                        </a:lnSpc>
+                        <a:spcAft>
+                          <a:spcPts val="0"/>
+                        </a:spcAft>
+                      </a:pPr>
+                      <a:r>
+                        <a:rPr lang="de-DE" sz="1600">
+                          <a:effectLst/>
+                        </a:rPr>
+                        <a:t>3</a:t>
+                      </a:r>
+                      <a:endParaRPr lang="de-DE" sz="1600">
+                        <a:solidFill>
+                          <a:srgbClr val="000000"/>
+                        </a:solidFill>
+                        <a:effectLst/>
+                        <a:latin typeface="Arial" panose="020B0604020202020204" pitchFamily="34" charset="0"/>
+                        <a:ea typeface="Cambria" panose="02040503050406030204" pitchFamily="18" charset="0"/>
+                        <a:cs typeface="Times New Roman" panose="02020603050405020304" pitchFamily="18" charset="0"/>
+                      </a:endParaRPr>
+                    </a:p>
+                  </a:txBody>
+                  <a:tcPr marL="63500" marR="63500" marT="0" marB="0" anchor="ctr"/>
+                </a:tc>
+                <a:extLst>
+                  <a:ext uri="{0D108BD9-81ED-4DB2-BD59-A6C34878D82A}">
+                    <a16:rowId xmlns:a16="http://schemas.microsoft.com/office/drawing/2014/main" val="4066021831"/>
+                  </a:ext>
+                </a:extLst>
+              </a:tr>
+              <a:tr h="459479">
+                <a:tc>
+                  <a:txBody>
+                    <a:bodyPr/>
+                    <a:lstStyle/>
+                    <a:p>
+                      <a:pPr>
+                        <a:lnSpc>
+                          <a:spcPts val="1300"/>
+                        </a:lnSpc>
+                        <a:spcAft>
+                          <a:spcPts val="0"/>
+                        </a:spcAft>
+                      </a:pPr>
+                      <a:r>
+                        <a:rPr lang="de-DE" sz="1600">
+                          <a:effectLst/>
+                        </a:rPr>
+                        <a:t>2014-0001-4200039194       </a:t>
+                      </a:r>
+                      <a:endParaRPr lang="de-DE" sz="1600">
+                        <a:solidFill>
+                          <a:srgbClr val="000000"/>
+                        </a:solidFill>
+                        <a:effectLst/>
+                        <a:latin typeface="Arial" panose="020B0604020202020204" pitchFamily="34" charset="0"/>
+                        <a:ea typeface="Cambria" panose="02040503050406030204" pitchFamily="18" charset="0"/>
+                        <a:cs typeface="Times New Roman" panose="02020603050405020304" pitchFamily="18" charset="0"/>
+                      </a:endParaRPr>
+                    </a:p>
+                  </a:txBody>
+                  <a:tcPr marL="63500" marR="63500" marT="0" marB="0" anchor="ctr"/>
+                </a:tc>
+                <a:tc>
+                  <a:txBody>
+                    <a:bodyPr/>
+                    <a:lstStyle/>
+                    <a:p>
+                      <a:pPr algn="ctr">
+                        <a:lnSpc>
+                          <a:spcPts val="1300"/>
+                        </a:lnSpc>
+                        <a:spcAft>
+                          <a:spcPts val="0"/>
+                        </a:spcAft>
+                      </a:pPr>
+                      <a:r>
+                        <a:rPr lang="de-DE" sz="1600">
+                          <a:effectLst/>
+                        </a:rPr>
+                        <a:t>4         </a:t>
+                      </a:r>
+                      <a:endParaRPr lang="de-DE" sz="1600">
+                        <a:solidFill>
+                          <a:srgbClr val="000000"/>
+                        </a:solidFill>
+                        <a:effectLst/>
+                        <a:latin typeface="Arial" panose="020B0604020202020204" pitchFamily="34" charset="0"/>
+                        <a:ea typeface="Cambria" panose="02040503050406030204" pitchFamily="18" charset="0"/>
+                        <a:cs typeface="Times New Roman" panose="02020603050405020304" pitchFamily="18" charset="0"/>
+                      </a:endParaRPr>
+                    </a:p>
+                  </a:txBody>
+                  <a:tcPr marL="63500" marR="63500" marT="0" marB="0" anchor="ctr"/>
+                </a:tc>
+                <a:tc>
+                  <a:txBody>
+                    <a:bodyPr/>
+                    <a:lstStyle/>
+                    <a:p>
+                      <a:pPr algn="ctr">
+                        <a:lnSpc>
+                          <a:spcPts val="1300"/>
+                        </a:lnSpc>
+                        <a:spcAft>
+                          <a:spcPts val="0"/>
+                        </a:spcAft>
+                      </a:pPr>
+                      <a:r>
+                        <a:rPr lang="de-DE" sz="1600">
+                          <a:effectLst/>
+                        </a:rPr>
+                        <a:t>7</a:t>
+                      </a:r>
+                      <a:endParaRPr lang="de-DE" sz="1600">
+                        <a:solidFill>
+                          <a:srgbClr val="000000"/>
+                        </a:solidFill>
+                        <a:effectLst/>
+                        <a:latin typeface="Arial" panose="020B0604020202020204" pitchFamily="34" charset="0"/>
+                        <a:ea typeface="Cambria" panose="02040503050406030204" pitchFamily="18" charset="0"/>
+                        <a:cs typeface="Times New Roman" panose="02020603050405020304" pitchFamily="18" charset="0"/>
+                      </a:endParaRPr>
+                    </a:p>
+                  </a:txBody>
+                  <a:tcPr marL="63500" marR="63500" marT="0" marB="0" anchor="ctr"/>
+                </a:tc>
+                <a:extLst>
+                  <a:ext uri="{0D108BD9-81ED-4DB2-BD59-A6C34878D82A}">
+                    <a16:rowId xmlns:a16="http://schemas.microsoft.com/office/drawing/2014/main" val="1488652131"/>
+                  </a:ext>
+                </a:extLst>
+              </a:tr>
+              <a:tr h="459479">
+                <a:tc>
+                  <a:txBody>
+                    <a:bodyPr/>
+                    <a:lstStyle/>
+                    <a:p>
+                      <a:pPr>
+                        <a:lnSpc>
+                          <a:spcPts val="1300"/>
+                        </a:lnSpc>
+                        <a:spcAft>
+                          <a:spcPts val="0"/>
+                        </a:spcAft>
+                      </a:pPr>
+                      <a:r>
+                        <a:rPr lang="de-DE" sz="1600">
+                          <a:effectLst/>
+                        </a:rPr>
+                        <a:t>2014-0001-4200046717       </a:t>
+                      </a:r>
+                      <a:endParaRPr lang="de-DE" sz="1600">
+                        <a:solidFill>
+                          <a:srgbClr val="000000"/>
+                        </a:solidFill>
+                        <a:effectLst/>
+                        <a:latin typeface="Arial" panose="020B0604020202020204" pitchFamily="34" charset="0"/>
+                        <a:ea typeface="Cambria" panose="02040503050406030204" pitchFamily="18" charset="0"/>
+                        <a:cs typeface="Times New Roman" panose="02020603050405020304" pitchFamily="18" charset="0"/>
+                      </a:endParaRPr>
+                    </a:p>
+                  </a:txBody>
+                  <a:tcPr marL="63500" marR="63500" marT="0" marB="0" anchor="ctr"/>
+                </a:tc>
+                <a:tc>
+                  <a:txBody>
+                    <a:bodyPr/>
+                    <a:lstStyle/>
+                    <a:p>
+                      <a:pPr algn="ctr">
+                        <a:lnSpc>
+                          <a:spcPts val="1300"/>
+                        </a:lnSpc>
+                        <a:spcAft>
+                          <a:spcPts val="0"/>
+                        </a:spcAft>
+                      </a:pPr>
+                      <a:r>
+                        <a:rPr lang="de-DE" sz="1600">
+                          <a:effectLst/>
+                        </a:rPr>
+                        <a:t>2         </a:t>
+                      </a:r>
+                      <a:endParaRPr lang="de-DE" sz="1600">
+                        <a:solidFill>
+                          <a:srgbClr val="000000"/>
+                        </a:solidFill>
+                        <a:effectLst/>
+                        <a:latin typeface="Arial" panose="020B0604020202020204" pitchFamily="34" charset="0"/>
+                        <a:ea typeface="Cambria" panose="02040503050406030204" pitchFamily="18" charset="0"/>
+                        <a:cs typeface="Times New Roman" panose="02020603050405020304" pitchFamily="18" charset="0"/>
+                      </a:endParaRPr>
+                    </a:p>
+                  </a:txBody>
+                  <a:tcPr marL="63500" marR="63500" marT="0" marB="0" anchor="ctr"/>
+                </a:tc>
+                <a:tc>
+                  <a:txBody>
+                    <a:bodyPr/>
+                    <a:lstStyle/>
+                    <a:p>
+                      <a:pPr algn="ctr">
+                        <a:lnSpc>
+                          <a:spcPts val="1300"/>
+                        </a:lnSpc>
+                        <a:spcAft>
+                          <a:spcPts val="0"/>
+                        </a:spcAft>
+                      </a:pPr>
+                      <a:r>
+                        <a:rPr lang="de-DE" sz="1600">
+                          <a:effectLst/>
+                        </a:rPr>
+                        <a:t>3</a:t>
+                      </a:r>
+                      <a:endParaRPr lang="de-DE" sz="1600">
+                        <a:solidFill>
+                          <a:srgbClr val="000000"/>
+                        </a:solidFill>
+                        <a:effectLst/>
+                        <a:latin typeface="Arial" panose="020B0604020202020204" pitchFamily="34" charset="0"/>
+                        <a:ea typeface="Cambria" panose="02040503050406030204" pitchFamily="18" charset="0"/>
+                        <a:cs typeface="Times New Roman" panose="02020603050405020304" pitchFamily="18" charset="0"/>
+                      </a:endParaRPr>
+                    </a:p>
+                  </a:txBody>
+                  <a:tcPr marL="63500" marR="63500" marT="0" marB="0" anchor="ctr"/>
+                </a:tc>
+                <a:extLst>
+                  <a:ext uri="{0D108BD9-81ED-4DB2-BD59-A6C34878D82A}">
+                    <a16:rowId xmlns:a16="http://schemas.microsoft.com/office/drawing/2014/main" val="3957014017"/>
+                  </a:ext>
+                </a:extLst>
+              </a:tr>
+              <a:tr h="459479">
+                <a:tc>
+                  <a:txBody>
+                    <a:bodyPr/>
+                    <a:lstStyle/>
+                    <a:p>
+                      <a:pPr>
+                        <a:lnSpc>
+                          <a:spcPts val="1300"/>
+                        </a:lnSpc>
+                        <a:spcAft>
+                          <a:spcPts val="0"/>
+                        </a:spcAft>
+                      </a:pPr>
+                      <a:r>
+                        <a:rPr lang="de-DE" sz="1600">
+                          <a:effectLst/>
+                        </a:rPr>
+                        <a:t>2014-0001-4200050312       </a:t>
+                      </a:r>
+                      <a:endParaRPr lang="de-DE" sz="1600">
+                        <a:solidFill>
+                          <a:srgbClr val="000000"/>
+                        </a:solidFill>
+                        <a:effectLst/>
+                        <a:latin typeface="Arial" panose="020B0604020202020204" pitchFamily="34" charset="0"/>
+                        <a:ea typeface="Cambria" panose="02040503050406030204" pitchFamily="18" charset="0"/>
+                        <a:cs typeface="Times New Roman" panose="02020603050405020304" pitchFamily="18" charset="0"/>
+                      </a:endParaRPr>
+                    </a:p>
+                  </a:txBody>
+                  <a:tcPr marL="63500" marR="63500" marT="0" marB="0" anchor="ctr"/>
+                </a:tc>
+                <a:tc>
+                  <a:txBody>
+                    <a:bodyPr/>
+                    <a:lstStyle/>
+                    <a:p>
+                      <a:pPr algn="ctr">
+                        <a:lnSpc>
+                          <a:spcPts val="1300"/>
+                        </a:lnSpc>
+                        <a:spcAft>
+                          <a:spcPts val="0"/>
+                        </a:spcAft>
+                      </a:pPr>
+                      <a:r>
+                        <a:rPr lang="de-DE" sz="1600">
+                          <a:effectLst/>
+                        </a:rPr>
+                        <a:t>2         </a:t>
+                      </a:r>
+                      <a:endParaRPr lang="de-DE" sz="1600">
+                        <a:solidFill>
+                          <a:srgbClr val="000000"/>
+                        </a:solidFill>
+                        <a:effectLst/>
+                        <a:latin typeface="Arial" panose="020B0604020202020204" pitchFamily="34" charset="0"/>
+                        <a:ea typeface="Cambria" panose="02040503050406030204" pitchFamily="18" charset="0"/>
+                        <a:cs typeface="Times New Roman" panose="02020603050405020304" pitchFamily="18" charset="0"/>
+                      </a:endParaRPr>
+                    </a:p>
+                  </a:txBody>
+                  <a:tcPr marL="63500" marR="63500" marT="0" marB="0" anchor="ctr"/>
+                </a:tc>
+                <a:tc>
+                  <a:txBody>
+                    <a:bodyPr/>
+                    <a:lstStyle/>
+                    <a:p>
+                      <a:pPr algn="ctr">
+                        <a:lnSpc>
+                          <a:spcPts val="1300"/>
+                        </a:lnSpc>
+                        <a:spcAft>
+                          <a:spcPts val="0"/>
+                        </a:spcAft>
+                      </a:pPr>
+                      <a:r>
+                        <a:rPr lang="de-DE" sz="1600" dirty="0">
+                          <a:effectLst/>
+                        </a:rPr>
+                        <a:t>3</a:t>
+                      </a:r>
+                      <a:endParaRPr lang="de-DE" sz="1600" dirty="0">
+                        <a:solidFill>
+                          <a:srgbClr val="000000"/>
+                        </a:solidFill>
+                        <a:effectLst/>
+                        <a:latin typeface="Arial" panose="020B0604020202020204" pitchFamily="34" charset="0"/>
+                        <a:ea typeface="Cambria" panose="02040503050406030204" pitchFamily="18" charset="0"/>
+                        <a:cs typeface="Times New Roman" panose="02020603050405020304" pitchFamily="18" charset="0"/>
+                      </a:endParaRPr>
+                    </a:p>
+                  </a:txBody>
+                  <a:tcPr marL="63500" marR="63500" marT="0" marB="0" anchor="ctr"/>
+                </a:tc>
+                <a:extLst>
+                  <a:ext uri="{0D108BD9-81ED-4DB2-BD59-A6C34878D82A}">
+                    <a16:rowId xmlns:a16="http://schemas.microsoft.com/office/drawing/2014/main" val="1488584275"/>
+                  </a:ext>
+                </a:extLst>
+              </a:tr>
+            </a:tbl>
+          </a:graphicData>
+        </a:graphic>
+      </p:graphicFrame>
+    </p:spTree>
+    <p:extLst>
+      <p:ext uri="{BB962C8B-B14F-4D97-AF65-F5344CB8AC3E}">
+        <p14:creationId xmlns:p14="http://schemas.microsoft.com/office/powerpoint/2010/main" val="4094346333"/>
+      </p:ext>
+    </p:extLst>
+  </p:cSld>
+  <p:clrMapOvr>
+    <a:masterClrMapping/>
+  </p:clrMapOvr>
+</p:sld>
+</file>
+
+<file path=ppt/slides/slide8.xml><?xml version="1.0" encoding="utf-8"?>
+<p:sld xmlns:a="http://schemas.openxmlformats.org/drawingml/2006/main" xmlns:r="http://schemas.openxmlformats.org/officeDocument/2006/relationships" xmlns:p="http://schemas.openxmlformats.org/presentationml/2006/main">
+  <p:cSld>
+    <p:spTree>
+      <p:nvGrpSpPr>
+        <p:cNvPr id="1" name=""/>
+        <p:cNvGrpSpPr/>
+        <p:nvPr/>
+      </p:nvGrpSpPr>
+      <p:grpSpPr>
+        <a:xfrm>
+          <a:off x="0" y="0"/>
+          <a:ext cx="0" cy="0"/>
+          <a:chOff x="0" y="0"/>
+          <a:chExt cx="0" cy="0"/>
+        </a:xfrm>
+      </p:grpSpPr>
+      <p:sp>
+        <p:nvSpPr>
+          <p:cNvPr id="2" name="Untertitel 1">
+            <a:extLst>
+              <a:ext uri="{FF2B5EF4-FFF2-40B4-BE49-F238E27FC236}">
+                <a16:creationId xmlns:a16="http://schemas.microsoft.com/office/drawing/2014/main" id="{545EDDDA-ABF6-458B-99FD-9830763AB873}"/>
+              </a:ext>
+            </a:extLst>
+          </p:cNvPr>
+          <p:cNvSpPr>
+            <a:spLocks noGrp="1"/>
+          </p:cNvSpPr>
+          <p:nvPr>
+            <p:ph type="subTitle" idx="1"/>
+          </p:nvPr>
+        </p:nvSpPr>
+        <p:spPr/>
+        <p:txBody>
+          <a:bodyPr/>
+          <a:lstStyle/>
+          <a:p>
+            <a:r>
+              <a:rPr lang="de-DE" dirty="0"/>
+              <a:t>Lückenhafte Buchungszeilen</a:t>
+            </a:r>
+          </a:p>
+        </p:txBody>
+      </p:sp>
+      <p:sp>
+        <p:nvSpPr>
+          <p:cNvPr id="3" name="Titel 2">
+            <a:extLst>
+              <a:ext uri="{FF2B5EF4-FFF2-40B4-BE49-F238E27FC236}">
+                <a16:creationId xmlns:a16="http://schemas.microsoft.com/office/drawing/2014/main" id="{032EC43A-7E32-4543-AF9A-AD0B8248DBE5}"/>
+              </a:ext>
+            </a:extLst>
+          </p:cNvPr>
+          <p:cNvSpPr>
+            <a:spLocks noGrp="1"/>
+          </p:cNvSpPr>
+          <p:nvPr>
+            <p:ph type="title"/>
+          </p:nvPr>
+        </p:nvSpPr>
+        <p:spPr/>
+        <p:txBody>
+          <a:bodyPr/>
+          <a:lstStyle/>
+          <a:p>
+            <a:r>
+              <a:rPr lang="de-DE" dirty="0"/>
+              <a:t>Grundlegende Integritätschecks</a:t>
+            </a:r>
+          </a:p>
+        </p:txBody>
+      </p:sp>
+      <p:sp>
+        <p:nvSpPr>
+          <p:cNvPr id="8" name="Inhaltsplatzhalter 7">
+            <a:extLst>
+              <a:ext uri="{FF2B5EF4-FFF2-40B4-BE49-F238E27FC236}">
+                <a16:creationId xmlns:a16="http://schemas.microsoft.com/office/drawing/2014/main" id="{C626D968-2EE0-4227-AF34-9ECCF4B9853C}"/>
+              </a:ext>
+            </a:extLst>
+          </p:cNvPr>
+          <p:cNvSpPr>
+            <a:spLocks noGrp="1"/>
+          </p:cNvSpPr>
+          <p:nvPr>
+            <p:ph sz="quarter" idx="12"/>
+          </p:nvPr>
+        </p:nvSpPr>
+        <p:spPr/>
+        <p:txBody>
+          <a:bodyPr/>
+          <a:lstStyle/>
+          <a:p>
+            <a:r>
+              <a:rPr lang="de-DE"/>
+              <a:t>Assoziiert </a:t>
+            </a:r>
+            <a:r>
+              <a:rPr lang="de-DE" dirty="0"/>
+              <a:t>mit</a:t>
+            </a:r>
+          </a:p>
+          <a:p>
+            <a:pPr lvl="1"/>
+            <a:r>
+              <a:rPr lang="de-DE" dirty="0"/>
+              <a:t>…</a:t>
+            </a:r>
+          </a:p>
+          <a:p>
+            <a:pPr lvl="1"/>
+            <a:r>
+              <a:rPr lang="de-DE" dirty="0"/>
+              <a:t>…</a:t>
+            </a:r>
+          </a:p>
+          <a:p>
+            <a:pPr lvl="1"/>
+            <a:r>
+              <a:rPr lang="de-DE" dirty="0"/>
+              <a:t>…</a:t>
+            </a:r>
+          </a:p>
+          <a:p>
+            <a:pPr lvl="1"/>
+            <a:endParaRPr lang="de-DE" dirty="0"/>
+          </a:p>
+        </p:txBody>
+      </p:sp>
+      <p:sp>
+        <p:nvSpPr>
+          <p:cNvPr id="4" name="Foliennummernplatzhalter 3">
+            <a:extLst>
+              <a:ext uri="{FF2B5EF4-FFF2-40B4-BE49-F238E27FC236}">
+                <a16:creationId xmlns:a16="http://schemas.microsoft.com/office/drawing/2014/main" id="{1FD26346-4474-471A-880D-77D2B3A06907}"/>
+              </a:ext>
+            </a:extLst>
+          </p:cNvPr>
+          <p:cNvSpPr>
+            <a:spLocks noGrp="1"/>
+          </p:cNvSpPr>
+          <p:nvPr>
+            <p:ph type="sldNum" sz="quarter" idx="4"/>
+          </p:nvPr>
+        </p:nvSpPr>
+        <p:spPr/>
+        <p:txBody>
+          <a:bodyPr/>
+          <a:lstStyle/>
+          <a:p>
+            <a:pPr>
+              <a:defRPr/>
+            </a:pPr>
+            <a:fld id="{9FF9BEAF-778C-7446-863C-7292389481CB}" type="slidenum">
+              <a:rPr lang="en-GB" noProof="0" smtClean="0"/>
+              <a:pPr>
+                <a:defRPr/>
+              </a:pPr>
+              <a:t>8</a:t>
+            </a:fld>
+            <a:endParaRPr lang="en-GB" noProof="0"/>
+          </a:p>
+        </p:txBody>
+      </p:sp>
+      <p:sp>
+        <p:nvSpPr>
+          <p:cNvPr id="5" name="Datumsplatzhalter 4">
+            <a:extLst>
+              <a:ext uri="{FF2B5EF4-FFF2-40B4-BE49-F238E27FC236}">
+                <a16:creationId xmlns:a16="http://schemas.microsoft.com/office/drawing/2014/main" id="{0B45531A-09CC-4712-B31D-D317DD7EDC02}"/>
+              </a:ext>
+            </a:extLst>
+          </p:cNvPr>
+          <p:cNvSpPr>
+            <a:spLocks noGrp="1"/>
+          </p:cNvSpPr>
+          <p:nvPr>
+            <p:ph type="dt" sz="half" idx="2"/>
+          </p:nvPr>
+        </p:nvSpPr>
+        <p:spPr/>
+        <p:txBody>
+          <a:bodyPr/>
+          <a:lstStyle/>
+          <a:p>
+            <a:pPr>
+              <a:defRPr/>
+            </a:pPr>
+            <a:fld id="{F36B4F74-2901-1B4A-A15E-8C1388FF047B}" type="datetime1">
+              <a:rPr lang="en-GB" noProof="0" smtClean="0"/>
+              <a:t>21/06/2020</a:t>
+            </a:fld>
+            <a:endParaRPr lang="en-GB" noProof="0"/>
+          </a:p>
+        </p:txBody>
+      </p:sp>
+    </p:spTree>
+    <p:extLst>
+      <p:ext uri="{BB962C8B-B14F-4D97-AF65-F5344CB8AC3E}">
+        <p14:creationId xmlns:p14="http://schemas.microsoft.com/office/powerpoint/2010/main" val="1557459646"/>
+      </p:ext>
+    </p:extLst>
+  </p:cSld>
+  <p:clrMapOvr>
+    <a:masterClrMapping/>
+  </p:clrMapOvr>
+</p:sld>
+</file>
+
+<file path=ppt/slides/slide9.xml><?xml version="1.0" encoding="utf-8"?>
 <p:sld xmlns:a="http://schemas.openxmlformats.org/drawingml/2006/main" xmlns:r="http://schemas.openxmlformats.org/officeDocument/2006/relationships" xmlns:p="http://schemas.openxmlformats.org/presentationml/2006/main">
   <p:cSld>
     <p:spTree>
@@ -12477,7 +14559,7 @@
           <a:p>
             <a:r>
               <a:rPr lang="de-DE" dirty="0"/>
-              <a:t>Trennfolie</a:t>
+              <a:t>Weiterführende Analyse</a:t>
             </a:r>
           </a:p>
         </p:txBody>
@@ -12509,7 +14591,7 @@
                   <a:srgbClr val="FFFFFF"/>
                 </a:highlight>
               </a:rPr>
-              <a:t>Untertitel</a:t>
+              <a:t>Prüfungen der buchenden Personen</a:t>
             </a:r>
           </a:p>
         </p:txBody>
@@ -12518,348 +14600,6 @@
     <p:extLst>
       <p:ext uri="{BB962C8B-B14F-4D97-AF65-F5344CB8AC3E}">
         <p14:creationId xmlns:p14="http://schemas.microsoft.com/office/powerpoint/2010/main" val="1243391510"/>
-      </p:ext>
-    </p:extLst>
-  </p:cSld>
-  <p:clrMapOvr>
-    <a:masterClrMapping/>
-  </p:clrMapOvr>
-</p:sld>
-</file>
-
-<file path=ppt/slides/slide5.xml><?xml version="1.0" encoding="utf-8"?>
-<p:sld xmlns:a="http://schemas.openxmlformats.org/drawingml/2006/main" xmlns:r="http://schemas.openxmlformats.org/officeDocument/2006/relationships" xmlns:p="http://schemas.openxmlformats.org/presentationml/2006/main">
-  <p:cSld>
-    <p:spTree>
-      <p:nvGrpSpPr>
-        <p:cNvPr id="1" name=""/>
-        <p:cNvGrpSpPr/>
-        <p:nvPr/>
-      </p:nvGrpSpPr>
-      <p:grpSpPr>
-        <a:xfrm>
-          <a:off x="0" y="0"/>
-          <a:ext cx="0" cy="0"/>
-          <a:chOff x="0" y="0"/>
-          <a:chExt cx="0" cy="0"/>
-        </a:xfrm>
-      </p:grpSpPr>
-      <p:sp>
-        <p:nvSpPr>
-          <p:cNvPr id="2" name="Inhaltsplatzhalter 1">
-            <a:extLst>
-              <a:ext uri="{FF2B5EF4-FFF2-40B4-BE49-F238E27FC236}">
-                <a16:creationId xmlns:a16="http://schemas.microsoft.com/office/drawing/2014/main" id="{40F1CFA2-2D72-4E75-8C49-C5F7F2A73033}"/>
-              </a:ext>
-            </a:extLst>
-          </p:cNvPr>
-          <p:cNvSpPr>
-            <a:spLocks noGrp="1"/>
-          </p:cNvSpPr>
-          <p:nvPr>
-            <p:ph sz="quarter" idx="12"/>
-          </p:nvPr>
-        </p:nvSpPr>
-        <p:spPr>
-          <a:xfrm>
-            <a:off x="706967" y="1604797"/>
-            <a:ext cx="10780613" cy="4416491"/>
-          </a:xfrm>
-        </p:spPr>
-        <p:txBody>
-          <a:bodyPr/>
-          <a:lstStyle/>
-          <a:p>
-            <a:r>
-              <a:rPr lang="de-DE" sz="2000" b="1" dirty="0">
-                <a:solidFill>
-                  <a:schemeClr val="accent3"/>
-                </a:solidFill>
-                <a:highlight>
-                  <a:srgbClr val="FFFF00"/>
-                </a:highlight>
-              </a:rPr>
-              <a:t>Check XYZ</a:t>
-            </a:r>
-            <a:br>
-              <a:rPr lang="de-DE" sz="2000" dirty="0">
-                <a:highlight>
-                  <a:srgbClr val="FFFF00"/>
-                </a:highlight>
-              </a:rPr>
-            </a:br>
-            <a:r>
-              <a:rPr lang="de-DE" sz="1800" dirty="0">
-                <a:highlight>
-                  <a:srgbClr val="FFFF00"/>
-                </a:highlight>
-              </a:rPr>
-              <a:t>….</a:t>
-            </a:r>
-            <a:endParaRPr lang="de-DE" sz="1000" dirty="0">
-              <a:highlight>
-                <a:srgbClr val="FFFF00"/>
-              </a:highlight>
-            </a:endParaRPr>
-          </a:p>
-          <a:p>
-            <a:r>
-              <a:rPr lang="de-DE" sz="2000" b="1" dirty="0">
-                <a:solidFill>
-                  <a:schemeClr val="accent3"/>
-                </a:solidFill>
-                <a:highlight>
-                  <a:srgbClr val="FFFF00"/>
-                </a:highlight>
-              </a:rPr>
-              <a:t>Check ABC: …</a:t>
-            </a:r>
-            <a:endParaRPr lang="de-DE" sz="1000" dirty="0">
-              <a:highlight>
-                <a:srgbClr val="FFFF00"/>
-              </a:highlight>
-            </a:endParaRPr>
-          </a:p>
-        </p:txBody>
-      </p:sp>
-      <p:sp>
-        <p:nvSpPr>
-          <p:cNvPr id="3" name="Titel 2">
-            <a:extLst>
-              <a:ext uri="{FF2B5EF4-FFF2-40B4-BE49-F238E27FC236}">
-                <a16:creationId xmlns:a16="http://schemas.microsoft.com/office/drawing/2014/main" id="{1512EDB5-0CD4-4F0B-AA2A-C216DCA7E269}"/>
-              </a:ext>
-            </a:extLst>
-          </p:cNvPr>
-          <p:cNvSpPr>
-            <a:spLocks noGrp="1"/>
-          </p:cNvSpPr>
-          <p:nvPr>
-            <p:ph type="title"/>
-          </p:nvPr>
-        </p:nvSpPr>
-        <p:spPr/>
-        <p:txBody>
-          <a:bodyPr/>
-          <a:lstStyle/>
-          <a:p>
-            <a:r>
-              <a:rPr lang="de-DE" dirty="0"/>
-              <a:t>Beispiel</a:t>
-            </a:r>
-          </a:p>
-        </p:txBody>
-      </p:sp>
-      <p:sp>
-        <p:nvSpPr>
-          <p:cNvPr id="4" name="Foliennummernplatzhalter 3">
-            <a:extLst>
-              <a:ext uri="{FF2B5EF4-FFF2-40B4-BE49-F238E27FC236}">
-                <a16:creationId xmlns:a16="http://schemas.microsoft.com/office/drawing/2014/main" id="{2202D80F-817B-4EAC-A5C0-9DC2F2AA9073}"/>
-              </a:ext>
-            </a:extLst>
-          </p:cNvPr>
-          <p:cNvSpPr>
-            <a:spLocks noGrp="1"/>
-          </p:cNvSpPr>
-          <p:nvPr>
-            <p:ph type="sldNum" sz="quarter" idx="4"/>
-          </p:nvPr>
-        </p:nvSpPr>
-        <p:spPr/>
-        <p:txBody>
-          <a:bodyPr/>
-          <a:lstStyle/>
-          <a:p>
-            <a:pPr>
-              <a:defRPr/>
-            </a:pPr>
-            <a:fld id="{9FF9BEAF-778C-7446-863C-7292389481CB}" type="slidenum">
-              <a:rPr lang="en-GB" noProof="0" smtClean="0"/>
-              <a:pPr>
-                <a:defRPr/>
-              </a:pPr>
-              <a:t>5</a:t>
-            </a:fld>
-            <a:endParaRPr lang="en-GB" noProof="0"/>
-          </a:p>
-        </p:txBody>
-      </p:sp>
-      <p:sp>
-        <p:nvSpPr>
-          <p:cNvPr id="5" name="Datumsplatzhalter 4">
-            <a:extLst>
-              <a:ext uri="{FF2B5EF4-FFF2-40B4-BE49-F238E27FC236}">
-                <a16:creationId xmlns:a16="http://schemas.microsoft.com/office/drawing/2014/main" id="{3151DC3E-34DC-42B9-87CF-93184068BE1A}"/>
-              </a:ext>
-            </a:extLst>
-          </p:cNvPr>
-          <p:cNvSpPr>
-            <a:spLocks noGrp="1"/>
-          </p:cNvSpPr>
-          <p:nvPr>
-            <p:ph type="dt" sz="half" idx="2"/>
-          </p:nvPr>
-        </p:nvSpPr>
-        <p:spPr/>
-        <p:txBody>
-          <a:bodyPr/>
-          <a:lstStyle/>
-          <a:p>
-            <a:pPr>
-              <a:defRPr/>
-            </a:pPr>
-            <a:fld id="{F36B4F74-2901-1B4A-A15E-8C1388FF047B}" type="datetime1">
-              <a:rPr lang="en-GB" noProof="0" smtClean="0"/>
-              <a:t>16/06/2020</a:t>
-            </a:fld>
-            <a:endParaRPr lang="en-GB" noProof="0"/>
-          </a:p>
-        </p:txBody>
-      </p:sp>
-    </p:spTree>
-    <p:extLst>
-      <p:ext uri="{BB962C8B-B14F-4D97-AF65-F5344CB8AC3E}">
-        <p14:creationId xmlns:p14="http://schemas.microsoft.com/office/powerpoint/2010/main" val="2273025397"/>
-      </p:ext>
-    </p:extLst>
-  </p:cSld>
-  <p:clrMapOvr>
-    <a:masterClrMapping/>
-  </p:clrMapOvr>
-</p:sld>
-</file>
-
-<file path=ppt/slides/slide6.xml><?xml version="1.0" encoding="utf-8"?>
-<p:sld xmlns:a="http://schemas.openxmlformats.org/drawingml/2006/main" xmlns:r="http://schemas.openxmlformats.org/officeDocument/2006/relationships" xmlns:p="http://schemas.openxmlformats.org/presentationml/2006/main">
-  <p:cSld>
-    <p:spTree>
-      <p:nvGrpSpPr>
-        <p:cNvPr id="1" name=""/>
-        <p:cNvGrpSpPr/>
-        <p:nvPr/>
-      </p:nvGrpSpPr>
-      <p:grpSpPr>
-        <a:xfrm>
-          <a:off x="0" y="0"/>
-          <a:ext cx="0" cy="0"/>
-          <a:chOff x="0" y="0"/>
-          <a:chExt cx="0" cy="0"/>
-        </a:xfrm>
-      </p:grpSpPr>
-      <p:sp>
-        <p:nvSpPr>
-          <p:cNvPr id="2" name="Titel 1"/>
-          <p:cNvSpPr>
-            <a:spLocks noGrp="1"/>
-          </p:cNvSpPr>
-          <p:nvPr>
-            <p:ph type="ctrTitle" sz="quarter"/>
-          </p:nvPr>
-        </p:nvSpPr>
-        <p:spPr/>
-        <p:txBody>
-          <a:bodyPr/>
-          <a:lstStyle/>
-          <a:p>
-            <a:r>
-              <a:rPr lang="de-DE" dirty="0"/>
-              <a:t>Dankeschön!</a:t>
-            </a:r>
-          </a:p>
-        </p:txBody>
-      </p:sp>
-      <p:sp>
-        <p:nvSpPr>
-          <p:cNvPr id="4" name="Untertitel 3"/>
-          <p:cNvSpPr>
-            <a:spLocks noGrp="1"/>
-          </p:cNvSpPr>
-          <p:nvPr>
-            <p:ph type="subTitle" sz="quarter" idx="1"/>
-          </p:nvPr>
-        </p:nvSpPr>
-        <p:spPr>
-          <a:xfrm>
-            <a:off x="731233" y="2844000"/>
-            <a:ext cx="10765367" cy="801024"/>
-          </a:xfrm>
-        </p:spPr>
-        <p:txBody>
-          <a:bodyPr/>
-          <a:lstStyle/>
-          <a:p>
-            <a:r>
-              <a:rPr lang="de-DE" sz="1800" dirty="0"/>
-              <a:t>Till Bieg</a:t>
-            </a:r>
-          </a:p>
-          <a:p>
-            <a:r>
-              <a:rPr lang="de-DE" sz="1800" dirty="0">
-                <a:hlinkClick r:id="rId2"/>
-              </a:rPr>
-              <a:t>till.bieg@fhwn.ac.at</a:t>
-            </a:r>
-            <a:endParaRPr lang="de-DE" sz="1800" dirty="0"/>
-          </a:p>
-          <a:p>
-            <a:endParaRPr lang="de-DE" sz="1800" dirty="0"/>
-          </a:p>
-          <a:p>
-            <a:r>
-              <a:rPr lang="de-DE" sz="1800" dirty="0"/>
-              <a:t>David Krug</a:t>
-            </a:r>
-          </a:p>
-          <a:p>
-            <a:r>
-              <a:rPr lang="de-DE" sz="1800" dirty="0">
-                <a:hlinkClick r:id="rId3"/>
-              </a:rPr>
-              <a:t>david.krug@fhwn.ac.at</a:t>
-            </a:r>
-            <a:endParaRPr lang="de-DE" sz="1800" dirty="0"/>
-          </a:p>
-          <a:p>
-            <a:endParaRPr lang="de-DE" sz="1800" dirty="0"/>
-          </a:p>
-        </p:txBody>
-      </p:sp>
-      <p:pic>
-        <p:nvPicPr>
-          <p:cNvPr id="5" name="Grafik 4">
-            <a:extLst>
-              <a:ext uri="{FF2B5EF4-FFF2-40B4-BE49-F238E27FC236}">
-                <a16:creationId xmlns:a16="http://schemas.microsoft.com/office/drawing/2014/main" id="{D52A1927-7724-48FB-99A3-17E6E6E3959B}"/>
-              </a:ext>
-            </a:extLst>
-          </p:cNvPr>
-          <p:cNvPicPr>
-            <a:picLocks noChangeAspect="1"/>
-          </p:cNvPicPr>
-          <p:nvPr/>
-        </p:nvPicPr>
-        <p:blipFill>
-          <a:blip r:embed="rId4"/>
-          <a:stretch>
-            <a:fillRect/>
-          </a:stretch>
-        </p:blipFill>
-        <p:spPr>
-          <a:xfrm>
-            <a:off x="8760296" y="188640"/>
-            <a:ext cx="2655739" cy="2655739"/>
-          </a:xfrm>
-          <a:prstGeom prst="rect">
-            <a:avLst/>
-          </a:prstGeom>
-        </p:spPr>
-      </p:pic>
-    </p:spTree>
-    <p:extLst>
-      <p:ext uri="{BB962C8B-B14F-4D97-AF65-F5344CB8AC3E}">
-        <p14:creationId xmlns:p14="http://schemas.microsoft.com/office/powerpoint/2010/main" val="945694928"/>
       </p:ext>
     </p:extLst>
   </p:cSld>
@@ -13238,7 +14978,7 @@
             </a14:hiddenLine>
           </a:ext>
           <a:ext uri="{FAA26D3D-D897-4be2-8F04-BA451C77F1D7}">
-            <ma14:placeholderFlag xmlns:ma14="http://schemas.microsoft.com/office/mac/drawingml/2011/main" xmlns="" val="1"/>
+            <ma14:placeholderFlag xmlns="" xmlns:ma14="http://schemas.microsoft.com/office/mac/drawingml/2011/main" val="1"/>
           </a:ext>
         </a:extLst>
       </a:spPr>

</xml_diff>